<commit_message>
add 002 introduction to GUI
</commit_message>
<xml_diff>
--- a/GUI_Python/Create_GUI_with_Python.pptx
+++ b/GUI_Python/Create_GUI_with_Python.pptx
@@ -5,15 +5,14 @@
     <p:sldMasterId id="2147483648" r:id="rId1"/>
   </p:sldMasterIdLst>
   <p:notesMasterIdLst>
-    <p:notesMasterId r:id="rId5"/>
+    <p:notesMasterId r:id="rId4"/>
   </p:notesMasterIdLst>
   <p:handoutMasterIdLst>
-    <p:handoutMasterId r:id="rId6"/>
+    <p:handoutMasterId r:id="rId5"/>
   </p:handoutMasterIdLst>
   <p:sldIdLst>
     <p:sldId id="256" r:id="rId2"/>
     <p:sldId id="257" r:id="rId3"/>
-    <p:sldId id="258" r:id="rId4"/>
   </p:sldIdLst>
   <p:sldSz cx="12192000" cy="6858000"/>
   <p:notesSz cx="6858000" cy="9144000"/>
@@ -4353,7 +4352,7 @@
         </p:blipFill>
         <p:spPr>
           <a:xfrm>
-            <a:off x="0" y="0"/>
+            <a:off x="119268" y="59634"/>
             <a:ext cx="611187" cy="671551"/>
           </a:xfrm>
           <a:prstGeom prst="rect">
@@ -4433,7 +4432,7 @@
         </p:blipFill>
         <p:spPr>
           <a:xfrm>
-            <a:off x="0" y="804263"/>
+            <a:off x="119268" y="863897"/>
             <a:ext cx="1374374" cy="2071274"/>
           </a:xfrm>
           <a:prstGeom prst="rect">
@@ -4708,8 +4707,88 @@
         </p:blipFill>
         <p:spPr>
           <a:xfrm>
-            <a:off x="4931834" y="2089150"/>
+            <a:off x="2208213" y="1954306"/>
             <a:ext cx="3925357" cy="3625850"/>
+          </a:xfrm>
+          <a:prstGeom prst="rect">
+            <a:avLst/>
+          </a:prstGeom>
+          <a:ln>
+            <a:noFill/>
+          </a:ln>
+          <a:effectLst>
+            <a:outerShdw blurRad="292100" dist="139700" dir="2700000" algn="tl" rotWithShape="0">
+              <a:srgbClr val="333333">
+                <a:alpha val="65000"/>
+              </a:srgbClr>
+            </a:outerShdw>
+          </a:effectLst>
+        </p:spPr>
+      </p:pic>
+      <p:pic>
+        <p:nvPicPr>
+          <p:cNvPr id="12" name="Picture 11">
+            <a:extLst>
+              <a:ext uri="{FF2B5EF4-FFF2-40B4-BE49-F238E27FC236}">
+                <a16:creationId xmlns:a16="http://schemas.microsoft.com/office/drawing/2014/main" id="{8E3CEAC5-BF73-4AB7-310A-510E8C96CBFD}"/>
+              </a:ext>
+            </a:extLst>
+          </p:cNvPr>
+          <p:cNvPicPr>
+            <a:picLocks noChangeAspect="1"/>
+          </p:cNvPicPr>
+          <p:nvPr/>
+        </p:nvPicPr>
+        <p:blipFill>
+          <a:blip r:embed="rId7"/>
+          <a:stretch>
+            <a:fillRect/>
+          </a:stretch>
+        </p:blipFill>
+        <p:spPr>
+          <a:xfrm>
+            <a:off x="6704541" y="1954306"/>
+            <a:ext cx="4305300" cy="2209800"/>
+          </a:xfrm>
+          <a:prstGeom prst="rect">
+            <a:avLst/>
+          </a:prstGeom>
+          <a:ln>
+            <a:noFill/>
+          </a:ln>
+          <a:effectLst>
+            <a:outerShdw blurRad="292100" dist="139700" dir="2700000" algn="tl" rotWithShape="0">
+              <a:srgbClr val="333333">
+                <a:alpha val="65000"/>
+              </a:srgbClr>
+            </a:outerShdw>
+          </a:effectLst>
+        </p:spPr>
+      </p:pic>
+      <p:pic>
+        <p:nvPicPr>
+          <p:cNvPr id="14" name="Picture 13">
+            <a:extLst>
+              <a:ext uri="{FF2B5EF4-FFF2-40B4-BE49-F238E27FC236}">
+                <a16:creationId xmlns:a16="http://schemas.microsoft.com/office/drawing/2014/main" id="{A0E9B3FC-1608-0491-943B-AE56CC42FF7E}"/>
+              </a:ext>
+            </a:extLst>
+          </p:cNvPr>
+          <p:cNvPicPr>
+            <a:picLocks noChangeAspect="1"/>
+          </p:cNvPicPr>
+          <p:nvPr/>
+        </p:nvPicPr>
+        <p:blipFill>
+          <a:blip r:embed="rId8"/>
+          <a:stretch>
+            <a:fillRect/>
+          </a:stretch>
+        </p:blipFill>
+        <p:spPr>
+          <a:xfrm>
+            <a:off x="8047566" y="4261764"/>
+            <a:ext cx="2962275" cy="1333500"/>
           </a:xfrm>
           <a:prstGeom prst="rect">
             <a:avLst/>
@@ -4730,468 +4809,6 @@
     <p:extLst>
       <p:ext uri="{BB962C8B-B14F-4D97-AF65-F5344CB8AC3E}">
         <p14:creationId xmlns:p14="http://schemas.microsoft.com/office/powerpoint/2010/main" val="3572012654"/>
-      </p:ext>
-    </p:extLst>
-  </p:cSld>
-  <p:clrMapOvr>
-    <a:masterClrMapping/>
-  </p:clrMapOvr>
-</p:sld>
-</file>
-
-<file path=ppt/slides/slide3.xml><?xml version="1.0" encoding="utf-8"?>
-<p:sld xmlns:a="http://schemas.openxmlformats.org/drawingml/2006/main" xmlns:r="http://schemas.openxmlformats.org/officeDocument/2006/relationships" xmlns:p="http://schemas.openxmlformats.org/presentationml/2006/main">
-  <p:cSld>
-    <p:spTree>
-      <p:nvGrpSpPr>
-        <p:cNvPr id="1" name=""/>
-        <p:cNvGrpSpPr/>
-        <p:nvPr/>
-      </p:nvGrpSpPr>
-      <p:grpSpPr>
-        <a:xfrm>
-          <a:off x="0" y="0"/>
-          <a:ext cx="0" cy="0"/>
-          <a:chOff x="0" y="0"/>
-          <a:chExt cx="0" cy="0"/>
-        </a:xfrm>
-      </p:grpSpPr>
-      <p:sp>
-        <p:nvSpPr>
-          <p:cNvPr id="2" name="Title 1">
-            <a:extLst>
-              <a:ext uri="{FF2B5EF4-FFF2-40B4-BE49-F238E27FC236}">
-                <a16:creationId xmlns:a16="http://schemas.microsoft.com/office/drawing/2014/main" id="{60BDC9E0-4942-655E-4150-9691AA9C765B}"/>
-              </a:ext>
-            </a:extLst>
-          </p:cNvPr>
-          <p:cNvSpPr>
-            <a:spLocks noGrp="1"/>
-          </p:cNvSpPr>
-          <p:nvPr>
-            <p:ph type="title"/>
-          </p:nvPr>
-        </p:nvSpPr>
-        <p:spPr>
-          <a:xfrm>
-            <a:off x="2208213" y="304799"/>
-            <a:ext cx="9372600" cy="1649507"/>
-          </a:xfrm>
-        </p:spPr>
-        <p:txBody>
-          <a:bodyPr anchor="ctr"/>
-          <a:lstStyle/>
-          <a:p>
-            <a:r>
-              <a:rPr lang="en-US" sz="4000" dirty="0">
-                <a:latin typeface="HarmonyOS Sans Black" panose="00000A00000000000000" pitchFamily="2" charset="0"/>
-              </a:rPr>
-              <a:t>Create GUI with Python</a:t>
-            </a:r>
-            <a:br>
-              <a:rPr lang="en-US" dirty="0">
-                <a:latin typeface="HarmonyOS Sans" panose="00000500000000000000" pitchFamily="2" charset="0"/>
-              </a:rPr>
-            </a:br>
-            <a:r>
-              <a:rPr lang="en-US" sz="5400" dirty="0">
-                <a:latin typeface="HarmonyOS Sans" panose="00000500000000000000" pitchFamily="2" charset="0"/>
-              </a:rPr>
-              <a:t>002 Wanted Poster</a:t>
-            </a:r>
-            <a:endParaRPr lang="en-US" dirty="0">
-              <a:latin typeface="HarmonyOS Sans" panose="00000500000000000000" pitchFamily="2" charset="0"/>
-            </a:endParaRPr>
-          </a:p>
-        </p:txBody>
-      </p:sp>
-      <p:sp>
-        <p:nvSpPr>
-          <p:cNvPr id="3" name="Content Placeholder 2">
-            <a:extLst>
-              <a:ext uri="{FF2B5EF4-FFF2-40B4-BE49-F238E27FC236}">
-                <a16:creationId xmlns:a16="http://schemas.microsoft.com/office/drawing/2014/main" id="{23E1EB2B-FC90-CE2F-FCC6-4356443773A0}"/>
-              </a:ext>
-            </a:extLst>
-          </p:cNvPr>
-          <p:cNvSpPr>
-            <a:spLocks noGrp="1"/>
-          </p:cNvSpPr>
-          <p:nvPr>
-            <p:ph idx="1"/>
-          </p:nvPr>
-        </p:nvSpPr>
-        <p:spPr>
-          <a:xfrm>
-            <a:off x="2208213" y="2088776"/>
-            <a:ext cx="9372600" cy="3626224"/>
-          </a:xfrm>
-        </p:spPr>
-        <p:txBody>
-          <a:bodyPr/>
-          <a:lstStyle/>
-          <a:p>
-            <a:endParaRPr lang="en-US"/>
-          </a:p>
-        </p:txBody>
-      </p:sp>
-      <p:pic>
-        <p:nvPicPr>
-          <p:cNvPr id="6" name="Picture 5">
-            <a:extLst>
-              <a:ext uri="{FF2B5EF4-FFF2-40B4-BE49-F238E27FC236}">
-                <a16:creationId xmlns:a16="http://schemas.microsoft.com/office/drawing/2014/main" id="{28525CF1-7DD8-7F22-12CB-14807078F0D7}"/>
-              </a:ext>
-            </a:extLst>
-          </p:cNvPr>
-          <p:cNvPicPr>
-            <a:picLocks noChangeAspect="1"/>
-          </p:cNvPicPr>
-          <p:nvPr/>
-        </p:nvPicPr>
-        <p:blipFill>
-          <a:blip r:embed="rId2"/>
-          <a:stretch>
-            <a:fillRect/>
-          </a:stretch>
-        </p:blipFill>
-        <p:spPr>
-          <a:xfrm>
-            <a:off x="0" y="0"/>
-            <a:ext cx="611187" cy="671551"/>
-          </a:xfrm>
-          <a:prstGeom prst="rect">
-            <a:avLst/>
-          </a:prstGeom>
-          <a:ln>
-            <a:noFill/>
-          </a:ln>
-          <a:effectLst>
-            <a:outerShdw blurRad="292100" dist="139700" dir="2700000" algn="tl" rotWithShape="0">
-              <a:srgbClr val="333333">
-                <a:alpha val="65000"/>
-              </a:srgbClr>
-            </a:outerShdw>
-          </a:effectLst>
-        </p:spPr>
-      </p:pic>
-      <p:pic>
-        <p:nvPicPr>
-          <p:cNvPr id="7" name="Picture 6">
-            <a:extLst>
-              <a:ext uri="{FF2B5EF4-FFF2-40B4-BE49-F238E27FC236}">
-                <a16:creationId xmlns:a16="http://schemas.microsoft.com/office/drawing/2014/main" id="{ACE06191-4455-E539-6992-17D338C10648}"/>
-              </a:ext>
-            </a:extLst>
-          </p:cNvPr>
-          <p:cNvPicPr>
-            <a:picLocks noChangeAspect="1"/>
-          </p:cNvPicPr>
-          <p:nvPr/>
-        </p:nvPicPr>
-        <p:blipFill>
-          <a:blip r:embed="rId3"/>
-          <a:stretch>
-            <a:fillRect/>
-          </a:stretch>
-        </p:blipFill>
-        <p:spPr>
-          <a:xfrm>
-            <a:off x="0" y="6471564"/>
-            <a:ext cx="1855694" cy="386435"/>
-          </a:xfrm>
-          <a:prstGeom prst="rect">
-            <a:avLst/>
-          </a:prstGeom>
-          <a:ln>
-            <a:noFill/>
-          </a:ln>
-          <a:effectLst>
-            <a:outerShdw blurRad="292100" dist="139700" dir="2700000" algn="tl" rotWithShape="0">
-              <a:srgbClr val="333333">
-                <a:alpha val="65000"/>
-              </a:srgbClr>
-            </a:outerShdw>
-          </a:effectLst>
-        </p:spPr>
-      </p:pic>
-      <p:pic>
-        <p:nvPicPr>
-          <p:cNvPr id="8" name="Picture 7">
-            <a:extLst>
-              <a:ext uri="{FF2B5EF4-FFF2-40B4-BE49-F238E27FC236}">
-                <a16:creationId xmlns:a16="http://schemas.microsoft.com/office/drawing/2014/main" id="{E815D6CC-086C-CEEA-B605-CC7A17A0C652}"/>
-              </a:ext>
-            </a:extLst>
-          </p:cNvPr>
-          <p:cNvPicPr>
-            <a:picLocks noChangeAspect="1"/>
-          </p:cNvPicPr>
-          <p:nvPr/>
-        </p:nvPicPr>
-        <p:blipFill>
-          <a:blip r:embed="rId4"/>
-          <a:stretch>
-            <a:fillRect/>
-          </a:stretch>
-        </p:blipFill>
-        <p:spPr>
-          <a:xfrm>
-            <a:off x="0" y="804263"/>
-            <a:ext cx="1374374" cy="2071274"/>
-          </a:xfrm>
-          <a:prstGeom prst="rect">
-            <a:avLst/>
-          </a:prstGeom>
-          <a:ln>
-            <a:noFill/>
-          </a:ln>
-          <a:effectLst>
-            <a:outerShdw blurRad="292100" dist="139700" dir="2700000" algn="tl" rotWithShape="0">
-              <a:srgbClr val="333333">
-                <a:alpha val="65000"/>
-              </a:srgbClr>
-            </a:outerShdw>
-          </a:effectLst>
-        </p:spPr>
-      </p:pic>
-      <p:sp>
-        <p:nvSpPr>
-          <p:cNvPr id="9" name="Subtitle 5">
-            <a:extLst>
-              <a:ext uri="{FF2B5EF4-FFF2-40B4-BE49-F238E27FC236}">
-                <a16:creationId xmlns:a16="http://schemas.microsoft.com/office/drawing/2014/main" id="{B98C3EDB-7ABC-5858-0198-A6F89107DC04}"/>
-              </a:ext>
-            </a:extLst>
-          </p:cNvPr>
-          <p:cNvSpPr txBox="1">
-            <a:spLocks/>
-          </p:cNvSpPr>
-          <p:nvPr/>
-        </p:nvSpPr>
-        <p:spPr>
-          <a:xfrm>
-            <a:off x="2747347" y="6471564"/>
-            <a:ext cx="7704856" cy="367591"/>
-          </a:xfrm>
-          <a:prstGeom prst="rect">
-            <a:avLst/>
-          </a:prstGeom>
-        </p:spPr>
-        <p:txBody>
-          <a:bodyPr vert="horz" lIns="91440" tIns="45720" rIns="91440" bIns="45720" rtlCol="0">
-            <a:normAutofit lnSpcReduction="10000"/>
-          </a:bodyPr>
-          <a:lstStyle>
-            <a:lvl1pPr marL="0" indent="0" algn="l" defTabSz="914400" rtl="0" eaLnBrk="1" latinLnBrk="0" hangingPunct="1">
-              <a:lnSpc>
-                <a:spcPct val="90000"/>
-              </a:lnSpc>
-              <a:spcBef>
-                <a:spcPts val="0"/>
-              </a:spcBef>
-              <a:buSzPct val="80000"/>
-              <a:buFont typeface="Wingdings" panose="05000000000000000000" pitchFamily="2" charset="2"/>
-              <a:buNone/>
-              <a:defRPr sz="2400" kern="1200">
-                <a:solidFill>
-                  <a:schemeClr val="accent2"/>
-                </a:solidFill>
-                <a:latin typeface="+mn-lt"/>
-                <a:ea typeface="+mn-ea"/>
-                <a:cs typeface="+mn-cs"/>
-              </a:defRPr>
-            </a:lvl1pPr>
-            <a:lvl2pPr marL="457200" indent="0" algn="ctr" defTabSz="914400" rtl="0" eaLnBrk="1" latinLnBrk="0" hangingPunct="1">
-              <a:lnSpc>
-                <a:spcPct val="90000"/>
-              </a:lnSpc>
-              <a:spcBef>
-                <a:spcPts val="1000"/>
-              </a:spcBef>
-              <a:buSzPct val="80000"/>
-              <a:buFont typeface="Wingdings" panose="05000000000000000000" pitchFamily="2" charset="2"/>
-              <a:buNone/>
-              <a:defRPr sz="2000" kern="1200">
-                <a:solidFill>
-                  <a:schemeClr val="tx1"/>
-                </a:solidFill>
-                <a:latin typeface="+mn-lt"/>
-                <a:ea typeface="+mn-ea"/>
-                <a:cs typeface="+mn-cs"/>
-              </a:defRPr>
-            </a:lvl2pPr>
-            <a:lvl3pPr marL="914400" indent="0" algn="ctr" defTabSz="914400" rtl="0" eaLnBrk="1" latinLnBrk="0" hangingPunct="1">
-              <a:lnSpc>
-                <a:spcPct val="90000"/>
-              </a:lnSpc>
-              <a:spcBef>
-                <a:spcPts val="800"/>
-              </a:spcBef>
-              <a:buSzPct val="80000"/>
-              <a:buFont typeface="Wingdings" panose="05000000000000000000" pitchFamily="2" charset="2"/>
-              <a:buNone/>
-              <a:defRPr sz="1800" kern="1200">
-                <a:solidFill>
-                  <a:schemeClr val="tx1"/>
-                </a:solidFill>
-                <a:latin typeface="+mn-lt"/>
-                <a:ea typeface="+mn-ea"/>
-                <a:cs typeface="+mn-cs"/>
-              </a:defRPr>
-            </a:lvl3pPr>
-            <a:lvl4pPr marL="1371600" indent="0" algn="ctr" defTabSz="914400" rtl="0" eaLnBrk="1" latinLnBrk="0" hangingPunct="1">
-              <a:lnSpc>
-                <a:spcPct val="90000"/>
-              </a:lnSpc>
-              <a:spcBef>
-                <a:spcPts val="800"/>
-              </a:spcBef>
-              <a:buSzPct val="80000"/>
-              <a:buFont typeface="Wingdings" panose="05000000000000000000" pitchFamily="2" charset="2"/>
-              <a:buNone/>
-              <a:defRPr sz="1600" kern="1200">
-                <a:solidFill>
-                  <a:schemeClr val="tx1"/>
-                </a:solidFill>
-                <a:latin typeface="+mn-lt"/>
-                <a:ea typeface="+mn-ea"/>
-                <a:cs typeface="+mn-cs"/>
-              </a:defRPr>
-            </a:lvl4pPr>
-            <a:lvl5pPr marL="1828800" indent="0" algn="ctr" defTabSz="914400" rtl="0" eaLnBrk="1" latinLnBrk="0" hangingPunct="1">
-              <a:lnSpc>
-                <a:spcPct val="90000"/>
-              </a:lnSpc>
-              <a:spcBef>
-                <a:spcPts val="800"/>
-              </a:spcBef>
-              <a:buSzPct val="80000"/>
-              <a:buFont typeface="Wingdings" panose="05000000000000000000" pitchFamily="2" charset="2"/>
-              <a:buNone/>
-              <a:defRPr sz="1600" kern="1200">
-                <a:solidFill>
-                  <a:schemeClr val="tx1"/>
-                </a:solidFill>
-                <a:latin typeface="+mn-lt"/>
-                <a:ea typeface="+mn-ea"/>
-                <a:cs typeface="+mn-cs"/>
-              </a:defRPr>
-            </a:lvl5pPr>
-            <a:lvl6pPr marL="2286000" indent="0" algn="ctr" defTabSz="914400" rtl="0" eaLnBrk="1" latinLnBrk="0" hangingPunct="1">
-              <a:lnSpc>
-                <a:spcPct val="90000"/>
-              </a:lnSpc>
-              <a:spcBef>
-                <a:spcPts val="800"/>
-              </a:spcBef>
-              <a:buSzPct val="80000"/>
-              <a:buFont typeface="Wingdings" panose="05000000000000000000" pitchFamily="2" charset="2"/>
-              <a:buNone/>
-              <a:defRPr sz="1600" kern="1200">
-                <a:solidFill>
-                  <a:schemeClr val="tx1"/>
-                </a:solidFill>
-                <a:latin typeface="+mn-lt"/>
-                <a:ea typeface="+mn-ea"/>
-                <a:cs typeface="+mn-cs"/>
-              </a:defRPr>
-            </a:lvl6pPr>
-            <a:lvl7pPr marL="2743200" indent="0" algn="ctr" defTabSz="914400" rtl="0" eaLnBrk="1" latinLnBrk="0" hangingPunct="1">
-              <a:lnSpc>
-                <a:spcPct val="90000"/>
-              </a:lnSpc>
-              <a:spcBef>
-                <a:spcPts val="800"/>
-              </a:spcBef>
-              <a:buSzPct val="80000"/>
-              <a:buFont typeface="Wingdings" panose="05000000000000000000" pitchFamily="2" charset="2"/>
-              <a:buNone/>
-              <a:defRPr sz="1600" kern="1200">
-                <a:solidFill>
-                  <a:schemeClr val="tx1"/>
-                </a:solidFill>
-                <a:latin typeface="+mn-lt"/>
-                <a:ea typeface="+mn-ea"/>
-                <a:cs typeface="+mn-cs"/>
-              </a:defRPr>
-            </a:lvl7pPr>
-            <a:lvl8pPr marL="3200400" indent="0" algn="ctr" defTabSz="914400" rtl="0" eaLnBrk="1" latinLnBrk="0" hangingPunct="1">
-              <a:lnSpc>
-                <a:spcPct val="90000"/>
-              </a:lnSpc>
-              <a:spcBef>
-                <a:spcPts val="800"/>
-              </a:spcBef>
-              <a:buSzPct val="80000"/>
-              <a:buFont typeface="Wingdings" panose="05000000000000000000" pitchFamily="2" charset="2"/>
-              <a:buNone/>
-              <a:defRPr sz="1600" kern="1200">
-                <a:solidFill>
-                  <a:schemeClr val="tx1"/>
-                </a:solidFill>
-                <a:latin typeface="+mn-lt"/>
-                <a:ea typeface="+mn-ea"/>
-                <a:cs typeface="+mn-cs"/>
-              </a:defRPr>
-            </a:lvl8pPr>
-            <a:lvl9pPr marL="3657600" indent="0" algn="ctr" defTabSz="914400" rtl="0" eaLnBrk="1" latinLnBrk="0" hangingPunct="1">
-              <a:lnSpc>
-                <a:spcPct val="90000"/>
-              </a:lnSpc>
-              <a:spcBef>
-                <a:spcPts val="800"/>
-              </a:spcBef>
-              <a:buSzPct val="80000"/>
-              <a:buFont typeface="Wingdings" panose="05000000000000000000" pitchFamily="2" charset="2"/>
-              <a:buNone/>
-              <a:defRPr sz="1600" kern="1200">
-                <a:solidFill>
-                  <a:schemeClr val="tx1"/>
-                </a:solidFill>
-                <a:latin typeface="+mn-lt"/>
-                <a:ea typeface="+mn-ea"/>
-                <a:cs typeface="+mn-cs"/>
-              </a:defRPr>
-            </a:lvl9pPr>
-          </a:lstStyle>
-          <a:p>
-            <a:pPr>
-              <a:lnSpc>
-                <a:spcPct val="120000"/>
-              </a:lnSpc>
-            </a:pPr>
-            <a:r>
-              <a:rPr lang="en-US" sz="1800" b="1" dirty="0">
-                <a:solidFill>
-                  <a:schemeClr val="accent2">
-                    <a:lumMod val="75000"/>
-                  </a:schemeClr>
-                </a:solidFill>
-                <a:hlinkClick r:id="rId5">
-                  <a:extLst>
-                    <a:ext uri="{A12FA001-AC4F-418D-AE19-62706E023703}">
-                      <ahyp:hlinkClr xmlns:ahyp="http://schemas.microsoft.com/office/drawing/2018/hyperlinkcolor" val="tx"/>
-                    </a:ext>
-                  </a:extLst>
-                </a:hlinkClick>
-              </a:rPr>
-              <a:t>https://github.com/yasenstar/python/tree/master/GUI_Python</a:t>
-            </a:r>
-            <a:endParaRPr lang="en-US" sz="1800" b="1" dirty="0">
-              <a:solidFill>
-                <a:schemeClr val="accent2">
-                  <a:lumMod val="75000"/>
-                </a:schemeClr>
-              </a:solidFill>
-            </a:endParaRPr>
-          </a:p>
-        </p:txBody>
-      </p:sp>
-    </p:spTree>
-    <p:extLst>
-      <p:ext uri="{BB962C8B-B14F-4D97-AF65-F5344CB8AC3E}">
-        <p14:creationId xmlns:p14="http://schemas.microsoft.com/office/powerpoint/2010/main" val="4096413041"/>
       </p:ext>
     </p:extLst>
   </p:cSld>

</xml_diff>

<commit_message>
prepare GUI with Python 003
</commit_message>
<xml_diff>
--- a/GUI_Python/Create_GUI_with_Python.pptx
+++ b/GUI_Python/Create_GUI_with_Python.pptx
@@ -5,14 +5,16 @@
     <p:sldMasterId id="2147483648" r:id="rId1"/>
   </p:sldMasterIdLst>
   <p:notesMasterIdLst>
-    <p:notesMasterId r:id="rId4"/>
+    <p:notesMasterId r:id="rId6"/>
   </p:notesMasterIdLst>
   <p:handoutMasterIdLst>
-    <p:handoutMasterId r:id="rId5"/>
+    <p:handoutMasterId r:id="rId7"/>
   </p:handoutMasterIdLst>
   <p:sldIdLst>
     <p:sldId id="256" r:id="rId2"/>
     <p:sldId id="257" r:id="rId3"/>
+    <p:sldId id="258" r:id="rId4"/>
+    <p:sldId id="259" r:id="rId5"/>
   </p:sldIdLst>
   <p:sldSz cx="12192000" cy="6858000"/>
   <p:notesSz cx="6858000" cy="9144000"/>
@@ -4304,7 +4306,9 @@
           </a:xfrm>
         </p:spPr>
         <p:txBody>
-          <a:bodyPr anchor="ctr"/>
+          <a:bodyPr anchor="ctr">
+            <a:normAutofit/>
+          </a:bodyPr>
           <a:lstStyle/>
           <a:p>
             <a:r>
@@ -4322,7 +4326,7 @@
               <a:rPr lang="en-US" sz="5400" dirty="0">
                 <a:latin typeface="HarmonyOS Sans" panose="00000500000000000000" pitchFamily="2" charset="0"/>
               </a:rPr>
-              <a:t>001 Ch01 Hello World in GUI</a:t>
+              <a:t>002 Ch01 Hello World in GUI</a:t>
             </a:r>
             <a:endParaRPr lang="en-US" dirty="0">
               <a:latin typeface="HarmonyOS Sans" panose="00000500000000000000" pitchFamily="2" charset="0"/>
@@ -4809,6 +4813,983 @@
     <p:extLst>
       <p:ext uri="{BB962C8B-B14F-4D97-AF65-F5344CB8AC3E}">
         <p14:creationId xmlns:p14="http://schemas.microsoft.com/office/powerpoint/2010/main" val="3572012654"/>
+      </p:ext>
+    </p:extLst>
+  </p:cSld>
+  <p:clrMapOvr>
+    <a:masterClrMapping/>
+  </p:clrMapOvr>
+</p:sld>
+</file>
+
+<file path=ppt/slides/slide3.xml><?xml version="1.0" encoding="utf-8"?>
+<p:sld xmlns:a="http://schemas.openxmlformats.org/drawingml/2006/main" xmlns:r="http://schemas.openxmlformats.org/officeDocument/2006/relationships" xmlns:p="http://schemas.openxmlformats.org/presentationml/2006/main">
+  <p:cSld>
+    <p:spTree>
+      <p:nvGrpSpPr>
+        <p:cNvPr id="1" name=""/>
+        <p:cNvGrpSpPr/>
+        <p:nvPr/>
+      </p:nvGrpSpPr>
+      <p:grpSpPr>
+        <a:xfrm>
+          <a:off x="0" y="0"/>
+          <a:ext cx="0" cy="0"/>
+          <a:chOff x="0" y="0"/>
+          <a:chExt cx="0" cy="0"/>
+        </a:xfrm>
+      </p:grpSpPr>
+      <p:sp>
+        <p:nvSpPr>
+          <p:cNvPr id="2" name="Title 1">
+            <a:extLst>
+              <a:ext uri="{FF2B5EF4-FFF2-40B4-BE49-F238E27FC236}">
+                <a16:creationId xmlns:a16="http://schemas.microsoft.com/office/drawing/2014/main" id="{60BDC9E0-4942-655E-4150-9691AA9C765B}"/>
+              </a:ext>
+            </a:extLst>
+          </p:cNvPr>
+          <p:cNvSpPr>
+            <a:spLocks noGrp="1"/>
+          </p:cNvSpPr>
+          <p:nvPr>
+            <p:ph type="title"/>
+          </p:nvPr>
+        </p:nvSpPr>
+        <p:spPr>
+          <a:xfrm>
+            <a:off x="2208213" y="304799"/>
+            <a:ext cx="9372600" cy="1649507"/>
+          </a:xfrm>
+        </p:spPr>
+        <p:txBody>
+          <a:bodyPr anchor="ctr">
+            <a:normAutofit/>
+          </a:bodyPr>
+          <a:lstStyle/>
+          <a:p>
+            <a:r>
+              <a:rPr lang="en-US" sz="4000" dirty="0">
+                <a:latin typeface="HarmonyOS Sans Black" panose="00000A00000000000000" pitchFamily="2" charset="0"/>
+              </a:rPr>
+              <a:t>Create GUI with Python</a:t>
+            </a:r>
+            <a:br>
+              <a:rPr lang="en-US" dirty="0">
+                <a:latin typeface="HarmonyOS Sans" panose="00000500000000000000" pitchFamily="2" charset="0"/>
+              </a:rPr>
+            </a:br>
+            <a:r>
+              <a:rPr lang="en-US" sz="5400" dirty="0">
+                <a:latin typeface="HarmonyOS Sans" panose="00000500000000000000" pitchFamily="2" charset="0"/>
+              </a:rPr>
+              <a:t>003 Ch02 Wanted Poster</a:t>
+            </a:r>
+            <a:endParaRPr lang="en-US" dirty="0">
+              <a:latin typeface="HarmonyOS Sans" panose="00000500000000000000" pitchFamily="2" charset="0"/>
+            </a:endParaRPr>
+          </a:p>
+        </p:txBody>
+      </p:sp>
+      <p:pic>
+        <p:nvPicPr>
+          <p:cNvPr id="6" name="Picture 5">
+            <a:extLst>
+              <a:ext uri="{FF2B5EF4-FFF2-40B4-BE49-F238E27FC236}">
+                <a16:creationId xmlns:a16="http://schemas.microsoft.com/office/drawing/2014/main" id="{28525CF1-7DD8-7F22-12CB-14807078F0D7}"/>
+              </a:ext>
+            </a:extLst>
+          </p:cNvPr>
+          <p:cNvPicPr>
+            <a:picLocks noChangeAspect="1"/>
+          </p:cNvPicPr>
+          <p:nvPr/>
+        </p:nvPicPr>
+        <p:blipFill>
+          <a:blip r:embed="rId2"/>
+          <a:stretch>
+            <a:fillRect/>
+          </a:stretch>
+        </p:blipFill>
+        <p:spPr>
+          <a:xfrm>
+            <a:off x="119268" y="59634"/>
+            <a:ext cx="611187" cy="671551"/>
+          </a:xfrm>
+          <a:prstGeom prst="rect">
+            <a:avLst/>
+          </a:prstGeom>
+          <a:ln>
+            <a:noFill/>
+          </a:ln>
+          <a:effectLst>
+            <a:outerShdw blurRad="292100" dist="139700" dir="2700000" algn="tl" rotWithShape="0">
+              <a:srgbClr val="333333">
+                <a:alpha val="65000"/>
+              </a:srgbClr>
+            </a:outerShdw>
+          </a:effectLst>
+        </p:spPr>
+      </p:pic>
+      <p:pic>
+        <p:nvPicPr>
+          <p:cNvPr id="7" name="Picture 6">
+            <a:extLst>
+              <a:ext uri="{FF2B5EF4-FFF2-40B4-BE49-F238E27FC236}">
+                <a16:creationId xmlns:a16="http://schemas.microsoft.com/office/drawing/2014/main" id="{ACE06191-4455-E539-6992-17D338C10648}"/>
+              </a:ext>
+            </a:extLst>
+          </p:cNvPr>
+          <p:cNvPicPr>
+            <a:picLocks noChangeAspect="1"/>
+          </p:cNvPicPr>
+          <p:nvPr/>
+        </p:nvPicPr>
+        <p:blipFill>
+          <a:blip r:embed="rId3"/>
+          <a:stretch>
+            <a:fillRect/>
+          </a:stretch>
+        </p:blipFill>
+        <p:spPr>
+          <a:xfrm>
+            <a:off x="0" y="6471564"/>
+            <a:ext cx="1855694" cy="386435"/>
+          </a:xfrm>
+          <a:prstGeom prst="rect">
+            <a:avLst/>
+          </a:prstGeom>
+          <a:ln>
+            <a:noFill/>
+          </a:ln>
+          <a:effectLst>
+            <a:outerShdw blurRad="292100" dist="139700" dir="2700000" algn="tl" rotWithShape="0">
+              <a:srgbClr val="333333">
+                <a:alpha val="65000"/>
+              </a:srgbClr>
+            </a:outerShdw>
+          </a:effectLst>
+        </p:spPr>
+      </p:pic>
+      <p:pic>
+        <p:nvPicPr>
+          <p:cNvPr id="8" name="Picture 7">
+            <a:extLst>
+              <a:ext uri="{FF2B5EF4-FFF2-40B4-BE49-F238E27FC236}">
+                <a16:creationId xmlns:a16="http://schemas.microsoft.com/office/drawing/2014/main" id="{E815D6CC-086C-CEEA-B605-CC7A17A0C652}"/>
+              </a:ext>
+            </a:extLst>
+          </p:cNvPr>
+          <p:cNvPicPr>
+            <a:picLocks noChangeAspect="1"/>
+          </p:cNvPicPr>
+          <p:nvPr/>
+        </p:nvPicPr>
+        <p:blipFill>
+          <a:blip r:embed="rId4"/>
+          <a:stretch>
+            <a:fillRect/>
+          </a:stretch>
+        </p:blipFill>
+        <p:spPr>
+          <a:xfrm>
+            <a:off x="119268" y="863897"/>
+            <a:ext cx="1374374" cy="2071274"/>
+          </a:xfrm>
+          <a:prstGeom prst="rect">
+            <a:avLst/>
+          </a:prstGeom>
+          <a:ln>
+            <a:noFill/>
+          </a:ln>
+          <a:effectLst>
+            <a:outerShdw blurRad="292100" dist="139700" dir="2700000" algn="tl" rotWithShape="0">
+              <a:srgbClr val="333333">
+                <a:alpha val="65000"/>
+              </a:srgbClr>
+            </a:outerShdw>
+          </a:effectLst>
+        </p:spPr>
+      </p:pic>
+      <p:sp>
+        <p:nvSpPr>
+          <p:cNvPr id="9" name="Subtitle 5">
+            <a:extLst>
+              <a:ext uri="{FF2B5EF4-FFF2-40B4-BE49-F238E27FC236}">
+                <a16:creationId xmlns:a16="http://schemas.microsoft.com/office/drawing/2014/main" id="{B98C3EDB-7ABC-5858-0198-A6F89107DC04}"/>
+              </a:ext>
+            </a:extLst>
+          </p:cNvPr>
+          <p:cNvSpPr txBox="1">
+            <a:spLocks/>
+          </p:cNvSpPr>
+          <p:nvPr/>
+        </p:nvSpPr>
+        <p:spPr>
+          <a:xfrm>
+            <a:off x="2747347" y="6471564"/>
+            <a:ext cx="7704856" cy="367591"/>
+          </a:xfrm>
+          <a:prstGeom prst="rect">
+            <a:avLst/>
+          </a:prstGeom>
+        </p:spPr>
+        <p:txBody>
+          <a:bodyPr vert="horz" lIns="91440" tIns="45720" rIns="91440" bIns="45720" rtlCol="0">
+            <a:normAutofit lnSpcReduction="10000"/>
+          </a:bodyPr>
+          <a:lstStyle>
+            <a:lvl1pPr marL="0" indent="0" algn="l" defTabSz="914400" rtl="0" eaLnBrk="1" latinLnBrk="0" hangingPunct="1">
+              <a:lnSpc>
+                <a:spcPct val="90000"/>
+              </a:lnSpc>
+              <a:spcBef>
+                <a:spcPts val="0"/>
+              </a:spcBef>
+              <a:buSzPct val="80000"/>
+              <a:buFont typeface="Wingdings" panose="05000000000000000000" pitchFamily="2" charset="2"/>
+              <a:buNone/>
+              <a:defRPr sz="2400" kern="1200">
+                <a:solidFill>
+                  <a:schemeClr val="accent2"/>
+                </a:solidFill>
+                <a:latin typeface="+mn-lt"/>
+                <a:ea typeface="+mn-ea"/>
+                <a:cs typeface="+mn-cs"/>
+              </a:defRPr>
+            </a:lvl1pPr>
+            <a:lvl2pPr marL="457200" indent="0" algn="ctr" defTabSz="914400" rtl="0" eaLnBrk="1" latinLnBrk="0" hangingPunct="1">
+              <a:lnSpc>
+                <a:spcPct val="90000"/>
+              </a:lnSpc>
+              <a:spcBef>
+                <a:spcPts val="1000"/>
+              </a:spcBef>
+              <a:buSzPct val="80000"/>
+              <a:buFont typeface="Wingdings" panose="05000000000000000000" pitchFamily="2" charset="2"/>
+              <a:buNone/>
+              <a:defRPr sz="2000" kern="1200">
+                <a:solidFill>
+                  <a:schemeClr val="tx1"/>
+                </a:solidFill>
+                <a:latin typeface="+mn-lt"/>
+                <a:ea typeface="+mn-ea"/>
+                <a:cs typeface="+mn-cs"/>
+              </a:defRPr>
+            </a:lvl2pPr>
+            <a:lvl3pPr marL="914400" indent="0" algn="ctr" defTabSz="914400" rtl="0" eaLnBrk="1" latinLnBrk="0" hangingPunct="1">
+              <a:lnSpc>
+                <a:spcPct val="90000"/>
+              </a:lnSpc>
+              <a:spcBef>
+                <a:spcPts val="800"/>
+              </a:spcBef>
+              <a:buSzPct val="80000"/>
+              <a:buFont typeface="Wingdings" panose="05000000000000000000" pitchFamily="2" charset="2"/>
+              <a:buNone/>
+              <a:defRPr sz="1800" kern="1200">
+                <a:solidFill>
+                  <a:schemeClr val="tx1"/>
+                </a:solidFill>
+                <a:latin typeface="+mn-lt"/>
+                <a:ea typeface="+mn-ea"/>
+                <a:cs typeface="+mn-cs"/>
+              </a:defRPr>
+            </a:lvl3pPr>
+            <a:lvl4pPr marL="1371600" indent="0" algn="ctr" defTabSz="914400" rtl="0" eaLnBrk="1" latinLnBrk="0" hangingPunct="1">
+              <a:lnSpc>
+                <a:spcPct val="90000"/>
+              </a:lnSpc>
+              <a:spcBef>
+                <a:spcPts val="800"/>
+              </a:spcBef>
+              <a:buSzPct val="80000"/>
+              <a:buFont typeface="Wingdings" panose="05000000000000000000" pitchFamily="2" charset="2"/>
+              <a:buNone/>
+              <a:defRPr sz="1600" kern="1200">
+                <a:solidFill>
+                  <a:schemeClr val="tx1"/>
+                </a:solidFill>
+                <a:latin typeface="+mn-lt"/>
+                <a:ea typeface="+mn-ea"/>
+                <a:cs typeface="+mn-cs"/>
+              </a:defRPr>
+            </a:lvl4pPr>
+            <a:lvl5pPr marL="1828800" indent="0" algn="ctr" defTabSz="914400" rtl="0" eaLnBrk="1" latinLnBrk="0" hangingPunct="1">
+              <a:lnSpc>
+                <a:spcPct val="90000"/>
+              </a:lnSpc>
+              <a:spcBef>
+                <a:spcPts val="800"/>
+              </a:spcBef>
+              <a:buSzPct val="80000"/>
+              <a:buFont typeface="Wingdings" panose="05000000000000000000" pitchFamily="2" charset="2"/>
+              <a:buNone/>
+              <a:defRPr sz="1600" kern="1200">
+                <a:solidFill>
+                  <a:schemeClr val="tx1"/>
+                </a:solidFill>
+                <a:latin typeface="+mn-lt"/>
+                <a:ea typeface="+mn-ea"/>
+                <a:cs typeface="+mn-cs"/>
+              </a:defRPr>
+            </a:lvl5pPr>
+            <a:lvl6pPr marL="2286000" indent="0" algn="ctr" defTabSz="914400" rtl="0" eaLnBrk="1" latinLnBrk="0" hangingPunct="1">
+              <a:lnSpc>
+                <a:spcPct val="90000"/>
+              </a:lnSpc>
+              <a:spcBef>
+                <a:spcPts val="800"/>
+              </a:spcBef>
+              <a:buSzPct val="80000"/>
+              <a:buFont typeface="Wingdings" panose="05000000000000000000" pitchFamily="2" charset="2"/>
+              <a:buNone/>
+              <a:defRPr sz="1600" kern="1200">
+                <a:solidFill>
+                  <a:schemeClr val="tx1"/>
+                </a:solidFill>
+                <a:latin typeface="+mn-lt"/>
+                <a:ea typeface="+mn-ea"/>
+                <a:cs typeface="+mn-cs"/>
+              </a:defRPr>
+            </a:lvl6pPr>
+            <a:lvl7pPr marL="2743200" indent="0" algn="ctr" defTabSz="914400" rtl="0" eaLnBrk="1" latinLnBrk="0" hangingPunct="1">
+              <a:lnSpc>
+                <a:spcPct val="90000"/>
+              </a:lnSpc>
+              <a:spcBef>
+                <a:spcPts val="800"/>
+              </a:spcBef>
+              <a:buSzPct val="80000"/>
+              <a:buFont typeface="Wingdings" panose="05000000000000000000" pitchFamily="2" charset="2"/>
+              <a:buNone/>
+              <a:defRPr sz="1600" kern="1200">
+                <a:solidFill>
+                  <a:schemeClr val="tx1"/>
+                </a:solidFill>
+                <a:latin typeface="+mn-lt"/>
+                <a:ea typeface="+mn-ea"/>
+                <a:cs typeface="+mn-cs"/>
+              </a:defRPr>
+            </a:lvl7pPr>
+            <a:lvl8pPr marL="3200400" indent="0" algn="ctr" defTabSz="914400" rtl="0" eaLnBrk="1" latinLnBrk="0" hangingPunct="1">
+              <a:lnSpc>
+                <a:spcPct val="90000"/>
+              </a:lnSpc>
+              <a:spcBef>
+                <a:spcPts val="800"/>
+              </a:spcBef>
+              <a:buSzPct val="80000"/>
+              <a:buFont typeface="Wingdings" panose="05000000000000000000" pitchFamily="2" charset="2"/>
+              <a:buNone/>
+              <a:defRPr sz="1600" kern="1200">
+                <a:solidFill>
+                  <a:schemeClr val="tx1"/>
+                </a:solidFill>
+                <a:latin typeface="+mn-lt"/>
+                <a:ea typeface="+mn-ea"/>
+                <a:cs typeface="+mn-cs"/>
+              </a:defRPr>
+            </a:lvl8pPr>
+            <a:lvl9pPr marL="3657600" indent="0" algn="ctr" defTabSz="914400" rtl="0" eaLnBrk="1" latinLnBrk="0" hangingPunct="1">
+              <a:lnSpc>
+                <a:spcPct val="90000"/>
+              </a:lnSpc>
+              <a:spcBef>
+                <a:spcPts val="800"/>
+              </a:spcBef>
+              <a:buSzPct val="80000"/>
+              <a:buFont typeface="Wingdings" panose="05000000000000000000" pitchFamily="2" charset="2"/>
+              <a:buNone/>
+              <a:defRPr sz="1600" kern="1200">
+                <a:solidFill>
+                  <a:schemeClr val="tx1"/>
+                </a:solidFill>
+                <a:latin typeface="+mn-lt"/>
+                <a:ea typeface="+mn-ea"/>
+                <a:cs typeface="+mn-cs"/>
+              </a:defRPr>
+            </a:lvl9pPr>
+          </a:lstStyle>
+          <a:p>
+            <a:pPr>
+              <a:lnSpc>
+                <a:spcPct val="120000"/>
+              </a:lnSpc>
+            </a:pPr>
+            <a:r>
+              <a:rPr lang="en-US" sz="1800" b="1" dirty="0">
+                <a:solidFill>
+                  <a:schemeClr val="accent2">
+                    <a:lumMod val="75000"/>
+                  </a:schemeClr>
+                </a:solidFill>
+                <a:hlinkClick r:id="rId5">
+                  <a:extLst>
+                    <a:ext uri="{A12FA001-AC4F-418D-AE19-62706E023703}">
+                      <ahyp:hlinkClr xmlns:ahyp="http://schemas.microsoft.com/office/drawing/2018/hyperlinkcolor" val="tx"/>
+                    </a:ext>
+                  </a:extLst>
+                </a:hlinkClick>
+              </a:rPr>
+              <a:t>https://github.com/yasenstar/python/tree/master/GUI_Python</a:t>
+            </a:r>
+            <a:endParaRPr lang="en-US" sz="1800" b="1" dirty="0">
+              <a:solidFill>
+                <a:schemeClr val="accent2">
+                  <a:lumMod val="75000"/>
+                </a:schemeClr>
+              </a:solidFill>
+            </a:endParaRPr>
+          </a:p>
+        </p:txBody>
+      </p:sp>
+      <p:pic>
+        <p:nvPicPr>
+          <p:cNvPr id="15" name="Content Placeholder 14">
+            <a:extLst>
+              <a:ext uri="{FF2B5EF4-FFF2-40B4-BE49-F238E27FC236}">
+                <a16:creationId xmlns:a16="http://schemas.microsoft.com/office/drawing/2014/main" id="{B971ABF1-80FF-2A98-5651-D1074D9FE508}"/>
+              </a:ext>
+            </a:extLst>
+          </p:cNvPr>
+          <p:cNvPicPr>
+            <a:picLocks noGrp="1" noChangeAspect="1"/>
+          </p:cNvPicPr>
+          <p:nvPr>
+            <p:ph idx="1"/>
+          </p:nvPr>
+        </p:nvPicPr>
+        <p:blipFill>
+          <a:blip r:embed="rId6">
+            <a:alphaModFix/>
+          </a:blip>
+          <a:stretch>
+            <a:fillRect/>
+          </a:stretch>
+        </p:blipFill>
+        <p:spPr>
+          <a:xfrm>
+            <a:off x="1643502" y="1836170"/>
+            <a:ext cx="6381984" cy="3352046"/>
+          </a:xfrm>
+          <a:prstGeom prst="rect">
+            <a:avLst/>
+          </a:prstGeom>
+          <a:ln>
+            <a:noFill/>
+          </a:ln>
+          <a:effectLst>
+            <a:outerShdw blurRad="292100" dist="139700" dir="2700000" algn="tl" rotWithShape="0">
+              <a:srgbClr val="333333">
+                <a:alpha val="65000"/>
+              </a:srgbClr>
+            </a:outerShdw>
+          </a:effectLst>
+        </p:spPr>
+      </p:pic>
+      <p:pic>
+        <p:nvPicPr>
+          <p:cNvPr id="11" name="Picture 10">
+            <a:extLst>
+              <a:ext uri="{FF2B5EF4-FFF2-40B4-BE49-F238E27FC236}">
+                <a16:creationId xmlns:a16="http://schemas.microsoft.com/office/drawing/2014/main" id="{643B93C9-23B4-0910-4C3D-5D73C85194E7}"/>
+              </a:ext>
+            </a:extLst>
+          </p:cNvPr>
+          <p:cNvPicPr>
+            <a:picLocks noChangeAspect="1"/>
+          </p:cNvPicPr>
+          <p:nvPr/>
+        </p:nvPicPr>
+        <p:blipFill>
+          <a:blip r:embed="rId7"/>
+          <a:stretch>
+            <a:fillRect/>
+          </a:stretch>
+        </p:blipFill>
+        <p:spPr>
+          <a:xfrm>
+            <a:off x="8175347" y="2545931"/>
+            <a:ext cx="3801945" cy="1932524"/>
+          </a:xfrm>
+          <a:prstGeom prst="rect">
+            <a:avLst/>
+          </a:prstGeom>
+          <a:ln>
+            <a:noFill/>
+          </a:ln>
+          <a:effectLst>
+            <a:outerShdw blurRad="292100" dist="139700" dir="2700000" algn="tl" rotWithShape="0">
+              <a:srgbClr val="333333">
+                <a:alpha val="65000"/>
+              </a:srgbClr>
+            </a:outerShdw>
+          </a:effectLst>
+        </p:spPr>
+      </p:pic>
+    </p:spTree>
+    <p:extLst>
+      <p:ext uri="{BB962C8B-B14F-4D97-AF65-F5344CB8AC3E}">
+        <p14:creationId xmlns:p14="http://schemas.microsoft.com/office/powerpoint/2010/main" val="203248221"/>
+      </p:ext>
+    </p:extLst>
+  </p:cSld>
+  <p:clrMapOvr>
+    <a:masterClrMapping/>
+  </p:clrMapOvr>
+</p:sld>
+</file>
+
+<file path=ppt/slides/slide4.xml><?xml version="1.0" encoding="utf-8"?>
+<p:sld xmlns:a="http://schemas.openxmlformats.org/drawingml/2006/main" xmlns:r="http://schemas.openxmlformats.org/officeDocument/2006/relationships" xmlns:p="http://schemas.openxmlformats.org/presentationml/2006/main">
+  <p:cSld>
+    <p:spTree>
+      <p:nvGrpSpPr>
+        <p:cNvPr id="1" name=""/>
+        <p:cNvGrpSpPr/>
+        <p:nvPr/>
+      </p:nvGrpSpPr>
+      <p:grpSpPr>
+        <a:xfrm>
+          <a:off x="0" y="0"/>
+          <a:ext cx="0" cy="0"/>
+          <a:chOff x="0" y="0"/>
+          <a:chExt cx="0" cy="0"/>
+        </a:xfrm>
+      </p:grpSpPr>
+      <p:sp>
+        <p:nvSpPr>
+          <p:cNvPr id="2" name="Title 1">
+            <a:extLst>
+              <a:ext uri="{FF2B5EF4-FFF2-40B4-BE49-F238E27FC236}">
+                <a16:creationId xmlns:a16="http://schemas.microsoft.com/office/drawing/2014/main" id="{60BDC9E0-4942-655E-4150-9691AA9C765B}"/>
+              </a:ext>
+            </a:extLst>
+          </p:cNvPr>
+          <p:cNvSpPr>
+            <a:spLocks noGrp="1"/>
+          </p:cNvSpPr>
+          <p:nvPr>
+            <p:ph type="title"/>
+          </p:nvPr>
+        </p:nvSpPr>
+        <p:spPr>
+          <a:xfrm>
+            <a:off x="2208213" y="304799"/>
+            <a:ext cx="9372600" cy="1649507"/>
+          </a:xfrm>
+        </p:spPr>
+        <p:txBody>
+          <a:bodyPr anchor="ctr">
+            <a:normAutofit/>
+          </a:bodyPr>
+          <a:lstStyle/>
+          <a:p>
+            <a:r>
+              <a:rPr lang="en-US" sz="4000" dirty="0">
+                <a:latin typeface="HarmonyOS Sans Black" panose="00000A00000000000000" pitchFamily="2" charset="0"/>
+              </a:rPr>
+              <a:t>Create GUI with Python</a:t>
+            </a:r>
+            <a:br>
+              <a:rPr lang="en-US" dirty="0">
+                <a:latin typeface="HarmonyOS Sans" panose="00000500000000000000" pitchFamily="2" charset="0"/>
+              </a:rPr>
+            </a:br>
+            <a:r>
+              <a:rPr lang="en-US" sz="5400" dirty="0">
+                <a:latin typeface="HarmonyOS Sans" panose="00000500000000000000" pitchFamily="2" charset="0"/>
+              </a:rPr>
+              <a:t>004 Ch03</a:t>
+            </a:r>
+            <a:endParaRPr lang="en-US" dirty="0">
+              <a:latin typeface="HarmonyOS Sans" panose="00000500000000000000" pitchFamily="2" charset="0"/>
+            </a:endParaRPr>
+          </a:p>
+        </p:txBody>
+      </p:sp>
+      <p:pic>
+        <p:nvPicPr>
+          <p:cNvPr id="6" name="Picture 5">
+            <a:extLst>
+              <a:ext uri="{FF2B5EF4-FFF2-40B4-BE49-F238E27FC236}">
+                <a16:creationId xmlns:a16="http://schemas.microsoft.com/office/drawing/2014/main" id="{28525CF1-7DD8-7F22-12CB-14807078F0D7}"/>
+              </a:ext>
+            </a:extLst>
+          </p:cNvPr>
+          <p:cNvPicPr>
+            <a:picLocks noChangeAspect="1"/>
+          </p:cNvPicPr>
+          <p:nvPr/>
+        </p:nvPicPr>
+        <p:blipFill>
+          <a:blip r:embed="rId2"/>
+          <a:stretch>
+            <a:fillRect/>
+          </a:stretch>
+        </p:blipFill>
+        <p:spPr>
+          <a:xfrm>
+            <a:off x="119268" y="59634"/>
+            <a:ext cx="611187" cy="671551"/>
+          </a:xfrm>
+          <a:prstGeom prst="rect">
+            <a:avLst/>
+          </a:prstGeom>
+          <a:ln>
+            <a:noFill/>
+          </a:ln>
+          <a:effectLst>
+            <a:outerShdw blurRad="292100" dist="139700" dir="2700000" algn="tl" rotWithShape="0">
+              <a:srgbClr val="333333">
+                <a:alpha val="65000"/>
+              </a:srgbClr>
+            </a:outerShdw>
+          </a:effectLst>
+        </p:spPr>
+      </p:pic>
+      <p:pic>
+        <p:nvPicPr>
+          <p:cNvPr id="7" name="Picture 6">
+            <a:extLst>
+              <a:ext uri="{FF2B5EF4-FFF2-40B4-BE49-F238E27FC236}">
+                <a16:creationId xmlns:a16="http://schemas.microsoft.com/office/drawing/2014/main" id="{ACE06191-4455-E539-6992-17D338C10648}"/>
+              </a:ext>
+            </a:extLst>
+          </p:cNvPr>
+          <p:cNvPicPr>
+            <a:picLocks noChangeAspect="1"/>
+          </p:cNvPicPr>
+          <p:nvPr/>
+        </p:nvPicPr>
+        <p:blipFill>
+          <a:blip r:embed="rId3"/>
+          <a:stretch>
+            <a:fillRect/>
+          </a:stretch>
+        </p:blipFill>
+        <p:spPr>
+          <a:xfrm>
+            <a:off x="0" y="6471564"/>
+            <a:ext cx="1855694" cy="386435"/>
+          </a:xfrm>
+          <a:prstGeom prst="rect">
+            <a:avLst/>
+          </a:prstGeom>
+          <a:ln>
+            <a:noFill/>
+          </a:ln>
+          <a:effectLst>
+            <a:outerShdw blurRad="292100" dist="139700" dir="2700000" algn="tl" rotWithShape="0">
+              <a:srgbClr val="333333">
+                <a:alpha val="65000"/>
+              </a:srgbClr>
+            </a:outerShdw>
+          </a:effectLst>
+        </p:spPr>
+      </p:pic>
+      <p:pic>
+        <p:nvPicPr>
+          <p:cNvPr id="8" name="Picture 7">
+            <a:extLst>
+              <a:ext uri="{FF2B5EF4-FFF2-40B4-BE49-F238E27FC236}">
+                <a16:creationId xmlns:a16="http://schemas.microsoft.com/office/drawing/2014/main" id="{E815D6CC-086C-CEEA-B605-CC7A17A0C652}"/>
+              </a:ext>
+            </a:extLst>
+          </p:cNvPr>
+          <p:cNvPicPr>
+            <a:picLocks noChangeAspect="1"/>
+          </p:cNvPicPr>
+          <p:nvPr/>
+        </p:nvPicPr>
+        <p:blipFill>
+          <a:blip r:embed="rId4"/>
+          <a:stretch>
+            <a:fillRect/>
+          </a:stretch>
+        </p:blipFill>
+        <p:spPr>
+          <a:xfrm>
+            <a:off x="119268" y="863897"/>
+            <a:ext cx="1374374" cy="2071274"/>
+          </a:xfrm>
+          <a:prstGeom prst="rect">
+            <a:avLst/>
+          </a:prstGeom>
+          <a:ln>
+            <a:noFill/>
+          </a:ln>
+          <a:effectLst>
+            <a:outerShdw blurRad="292100" dist="139700" dir="2700000" algn="tl" rotWithShape="0">
+              <a:srgbClr val="333333">
+                <a:alpha val="65000"/>
+              </a:srgbClr>
+            </a:outerShdw>
+          </a:effectLst>
+        </p:spPr>
+      </p:pic>
+      <p:sp>
+        <p:nvSpPr>
+          <p:cNvPr id="9" name="Subtitle 5">
+            <a:extLst>
+              <a:ext uri="{FF2B5EF4-FFF2-40B4-BE49-F238E27FC236}">
+                <a16:creationId xmlns:a16="http://schemas.microsoft.com/office/drawing/2014/main" id="{B98C3EDB-7ABC-5858-0198-A6F89107DC04}"/>
+              </a:ext>
+            </a:extLst>
+          </p:cNvPr>
+          <p:cNvSpPr txBox="1">
+            <a:spLocks/>
+          </p:cNvSpPr>
+          <p:nvPr/>
+        </p:nvSpPr>
+        <p:spPr>
+          <a:xfrm>
+            <a:off x="2747347" y="6471564"/>
+            <a:ext cx="7704856" cy="367591"/>
+          </a:xfrm>
+          <a:prstGeom prst="rect">
+            <a:avLst/>
+          </a:prstGeom>
+        </p:spPr>
+        <p:txBody>
+          <a:bodyPr vert="horz" lIns="91440" tIns="45720" rIns="91440" bIns="45720" rtlCol="0">
+            <a:normAutofit lnSpcReduction="10000"/>
+          </a:bodyPr>
+          <a:lstStyle>
+            <a:lvl1pPr marL="0" indent="0" algn="l" defTabSz="914400" rtl="0" eaLnBrk="1" latinLnBrk="0" hangingPunct="1">
+              <a:lnSpc>
+                <a:spcPct val="90000"/>
+              </a:lnSpc>
+              <a:spcBef>
+                <a:spcPts val="0"/>
+              </a:spcBef>
+              <a:buSzPct val="80000"/>
+              <a:buFont typeface="Wingdings" panose="05000000000000000000" pitchFamily="2" charset="2"/>
+              <a:buNone/>
+              <a:defRPr sz="2400" kern="1200">
+                <a:solidFill>
+                  <a:schemeClr val="accent2"/>
+                </a:solidFill>
+                <a:latin typeface="+mn-lt"/>
+                <a:ea typeface="+mn-ea"/>
+                <a:cs typeface="+mn-cs"/>
+              </a:defRPr>
+            </a:lvl1pPr>
+            <a:lvl2pPr marL="457200" indent="0" algn="ctr" defTabSz="914400" rtl="0" eaLnBrk="1" latinLnBrk="0" hangingPunct="1">
+              <a:lnSpc>
+                <a:spcPct val="90000"/>
+              </a:lnSpc>
+              <a:spcBef>
+                <a:spcPts val="1000"/>
+              </a:spcBef>
+              <a:buSzPct val="80000"/>
+              <a:buFont typeface="Wingdings" panose="05000000000000000000" pitchFamily="2" charset="2"/>
+              <a:buNone/>
+              <a:defRPr sz="2000" kern="1200">
+                <a:solidFill>
+                  <a:schemeClr val="tx1"/>
+                </a:solidFill>
+                <a:latin typeface="+mn-lt"/>
+                <a:ea typeface="+mn-ea"/>
+                <a:cs typeface="+mn-cs"/>
+              </a:defRPr>
+            </a:lvl2pPr>
+            <a:lvl3pPr marL="914400" indent="0" algn="ctr" defTabSz="914400" rtl="0" eaLnBrk="1" latinLnBrk="0" hangingPunct="1">
+              <a:lnSpc>
+                <a:spcPct val="90000"/>
+              </a:lnSpc>
+              <a:spcBef>
+                <a:spcPts val="800"/>
+              </a:spcBef>
+              <a:buSzPct val="80000"/>
+              <a:buFont typeface="Wingdings" panose="05000000000000000000" pitchFamily="2" charset="2"/>
+              <a:buNone/>
+              <a:defRPr sz="1800" kern="1200">
+                <a:solidFill>
+                  <a:schemeClr val="tx1"/>
+                </a:solidFill>
+                <a:latin typeface="+mn-lt"/>
+                <a:ea typeface="+mn-ea"/>
+                <a:cs typeface="+mn-cs"/>
+              </a:defRPr>
+            </a:lvl3pPr>
+            <a:lvl4pPr marL="1371600" indent="0" algn="ctr" defTabSz="914400" rtl="0" eaLnBrk="1" latinLnBrk="0" hangingPunct="1">
+              <a:lnSpc>
+                <a:spcPct val="90000"/>
+              </a:lnSpc>
+              <a:spcBef>
+                <a:spcPts val="800"/>
+              </a:spcBef>
+              <a:buSzPct val="80000"/>
+              <a:buFont typeface="Wingdings" panose="05000000000000000000" pitchFamily="2" charset="2"/>
+              <a:buNone/>
+              <a:defRPr sz="1600" kern="1200">
+                <a:solidFill>
+                  <a:schemeClr val="tx1"/>
+                </a:solidFill>
+                <a:latin typeface="+mn-lt"/>
+                <a:ea typeface="+mn-ea"/>
+                <a:cs typeface="+mn-cs"/>
+              </a:defRPr>
+            </a:lvl4pPr>
+            <a:lvl5pPr marL="1828800" indent="0" algn="ctr" defTabSz="914400" rtl="0" eaLnBrk="1" latinLnBrk="0" hangingPunct="1">
+              <a:lnSpc>
+                <a:spcPct val="90000"/>
+              </a:lnSpc>
+              <a:spcBef>
+                <a:spcPts val="800"/>
+              </a:spcBef>
+              <a:buSzPct val="80000"/>
+              <a:buFont typeface="Wingdings" panose="05000000000000000000" pitchFamily="2" charset="2"/>
+              <a:buNone/>
+              <a:defRPr sz="1600" kern="1200">
+                <a:solidFill>
+                  <a:schemeClr val="tx1"/>
+                </a:solidFill>
+                <a:latin typeface="+mn-lt"/>
+                <a:ea typeface="+mn-ea"/>
+                <a:cs typeface="+mn-cs"/>
+              </a:defRPr>
+            </a:lvl5pPr>
+            <a:lvl6pPr marL="2286000" indent="0" algn="ctr" defTabSz="914400" rtl="0" eaLnBrk="1" latinLnBrk="0" hangingPunct="1">
+              <a:lnSpc>
+                <a:spcPct val="90000"/>
+              </a:lnSpc>
+              <a:spcBef>
+                <a:spcPts val="800"/>
+              </a:spcBef>
+              <a:buSzPct val="80000"/>
+              <a:buFont typeface="Wingdings" panose="05000000000000000000" pitchFamily="2" charset="2"/>
+              <a:buNone/>
+              <a:defRPr sz="1600" kern="1200">
+                <a:solidFill>
+                  <a:schemeClr val="tx1"/>
+                </a:solidFill>
+                <a:latin typeface="+mn-lt"/>
+                <a:ea typeface="+mn-ea"/>
+                <a:cs typeface="+mn-cs"/>
+              </a:defRPr>
+            </a:lvl6pPr>
+            <a:lvl7pPr marL="2743200" indent="0" algn="ctr" defTabSz="914400" rtl="0" eaLnBrk="1" latinLnBrk="0" hangingPunct="1">
+              <a:lnSpc>
+                <a:spcPct val="90000"/>
+              </a:lnSpc>
+              <a:spcBef>
+                <a:spcPts val="800"/>
+              </a:spcBef>
+              <a:buSzPct val="80000"/>
+              <a:buFont typeface="Wingdings" panose="05000000000000000000" pitchFamily="2" charset="2"/>
+              <a:buNone/>
+              <a:defRPr sz="1600" kern="1200">
+                <a:solidFill>
+                  <a:schemeClr val="tx1"/>
+                </a:solidFill>
+                <a:latin typeface="+mn-lt"/>
+                <a:ea typeface="+mn-ea"/>
+                <a:cs typeface="+mn-cs"/>
+              </a:defRPr>
+            </a:lvl7pPr>
+            <a:lvl8pPr marL="3200400" indent="0" algn="ctr" defTabSz="914400" rtl="0" eaLnBrk="1" latinLnBrk="0" hangingPunct="1">
+              <a:lnSpc>
+                <a:spcPct val="90000"/>
+              </a:lnSpc>
+              <a:spcBef>
+                <a:spcPts val="800"/>
+              </a:spcBef>
+              <a:buSzPct val="80000"/>
+              <a:buFont typeface="Wingdings" panose="05000000000000000000" pitchFamily="2" charset="2"/>
+              <a:buNone/>
+              <a:defRPr sz="1600" kern="1200">
+                <a:solidFill>
+                  <a:schemeClr val="tx1"/>
+                </a:solidFill>
+                <a:latin typeface="+mn-lt"/>
+                <a:ea typeface="+mn-ea"/>
+                <a:cs typeface="+mn-cs"/>
+              </a:defRPr>
+            </a:lvl8pPr>
+            <a:lvl9pPr marL="3657600" indent="0" algn="ctr" defTabSz="914400" rtl="0" eaLnBrk="1" latinLnBrk="0" hangingPunct="1">
+              <a:lnSpc>
+                <a:spcPct val="90000"/>
+              </a:lnSpc>
+              <a:spcBef>
+                <a:spcPts val="800"/>
+              </a:spcBef>
+              <a:buSzPct val="80000"/>
+              <a:buFont typeface="Wingdings" panose="05000000000000000000" pitchFamily="2" charset="2"/>
+              <a:buNone/>
+              <a:defRPr sz="1600" kern="1200">
+                <a:solidFill>
+                  <a:schemeClr val="tx1"/>
+                </a:solidFill>
+                <a:latin typeface="+mn-lt"/>
+                <a:ea typeface="+mn-ea"/>
+                <a:cs typeface="+mn-cs"/>
+              </a:defRPr>
+            </a:lvl9pPr>
+          </a:lstStyle>
+          <a:p>
+            <a:pPr>
+              <a:lnSpc>
+                <a:spcPct val="120000"/>
+              </a:lnSpc>
+            </a:pPr>
+            <a:r>
+              <a:rPr lang="en-US" sz="1800" b="1" dirty="0">
+                <a:solidFill>
+                  <a:schemeClr val="accent2">
+                    <a:lumMod val="75000"/>
+                  </a:schemeClr>
+                </a:solidFill>
+                <a:hlinkClick r:id="rId5">
+                  <a:extLst>
+                    <a:ext uri="{A12FA001-AC4F-418D-AE19-62706E023703}">
+                      <ahyp:hlinkClr xmlns:ahyp="http://schemas.microsoft.com/office/drawing/2018/hyperlinkcolor" val="tx"/>
+                    </a:ext>
+                  </a:extLst>
+                </a:hlinkClick>
+              </a:rPr>
+              <a:t>https://github.com/yasenstar/python/tree/master/GUI_Python</a:t>
+            </a:r>
+            <a:endParaRPr lang="en-US" sz="1800" b="1" dirty="0">
+              <a:solidFill>
+                <a:schemeClr val="accent2">
+                  <a:lumMod val="75000"/>
+                </a:schemeClr>
+              </a:solidFill>
+            </a:endParaRPr>
+          </a:p>
+        </p:txBody>
+      </p:sp>
+      <p:sp>
+        <p:nvSpPr>
+          <p:cNvPr id="4" name="Content Placeholder 3">
+            <a:extLst>
+              <a:ext uri="{FF2B5EF4-FFF2-40B4-BE49-F238E27FC236}">
+                <a16:creationId xmlns:a16="http://schemas.microsoft.com/office/drawing/2014/main" id="{4825453B-CB5C-6371-1E6A-222690B860E9}"/>
+              </a:ext>
+            </a:extLst>
+          </p:cNvPr>
+          <p:cNvSpPr>
+            <a:spLocks noGrp="1"/>
+          </p:cNvSpPr>
+          <p:nvPr>
+            <p:ph idx="1"/>
+          </p:nvPr>
+        </p:nvSpPr>
+        <p:spPr/>
+        <p:txBody>
+          <a:bodyPr/>
+          <a:lstStyle/>
+          <a:p>
+            <a:endParaRPr lang="en-US" dirty="0"/>
+          </a:p>
+        </p:txBody>
+      </p:sp>
+    </p:spTree>
+    <p:extLst>
+      <p:ext uri="{BB962C8B-B14F-4D97-AF65-F5344CB8AC3E}">
+        <p14:creationId xmlns:p14="http://schemas.microsoft.com/office/powerpoint/2010/main" val="3231435790"/>
       </p:ext>
     </p:extLst>
   </p:cSld>

</xml_diff>

<commit_message>
prepare ch03 Spy Name Chooser
</commit_message>
<xml_diff>
--- a/GUI_Python/Create_GUI_with_Python.pptx
+++ b/GUI_Python/Create_GUI_with_Python.pptx
@@ -5400,7 +5400,7 @@
               <a:rPr lang="en-US" sz="5400" dirty="0">
                 <a:latin typeface="HarmonyOS Sans" panose="00000500000000000000" pitchFamily="2" charset="0"/>
               </a:rPr>
-              <a:t>004 Ch03</a:t>
+              <a:t>004 Ch03 Spy Name Chooser</a:t>
             </a:r>
             <a:endParaRPr lang="en-US" dirty="0">
               <a:latin typeface="HarmonyOS Sans" panose="00000500000000000000" pitchFamily="2" charset="0"/>
@@ -5761,31 +5761,88 @@
           </a:p>
         </p:txBody>
       </p:sp>
-      <p:sp>
-        <p:nvSpPr>
-          <p:cNvPr id="4" name="Content Placeholder 3">
+      <p:pic>
+        <p:nvPicPr>
+          <p:cNvPr id="13" name="Content Placeholder 12">
             <a:extLst>
               <a:ext uri="{FF2B5EF4-FFF2-40B4-BE49-F238E27FC236}">
-                <a16:creationId xmlns:a16="http://schemas.microsoft.com/office/drawing/2014/main" id="{4825453B-CB5C-6371-1E6A-222690B860E9}"/>
+                <a16:creationId xmlns:a16="http://schemas.microsoft.com/office/drawing/2014/main" id="{61CE23D5-81B1-20F1-E2BC-4C6589C428E9}"/>
               </a:ext>
             </a:extLst>
           </p:cNvPr>
-          <p:cNvSpPr>
-            <a:spLocks noGrp="1"/>
-          </p:cNvSpPr>
+          <p:cNvPicPr>
+            <a:picLocks noGrp="1" noChangeAspect="1"/>
+          </p:cNvPicPr>
           <p:nvPr>
             <p:ph idx="1"/>
           </p:nvPr>
-        </p:nvSpPr>
-        <p:spPr/>
-        <p:txBody>
-          <a:bodyPr/>
-          <a:lstStyle/>
-          <a:p>
-            <a:endParaRPr lang="en-US" dirty="0"/>
-          </a:p>
-        </p:txBody>
-      </p:sp>
+        </p:nvPicPr>
+        <p:blipFill>
+          <a:blip r:embed="rId6"/>
+          <a:stretch>
+            <a:fillRect/>
+          </a:stretch>
+        </p:blipFill>
+        <p:spPr>
+          <a:xfrm>
+            <a:off x="2039693" y="1713322"/>
+            <a:ext cx="5411017" cy="4114800"/>
+          </a:xfrm>
+          <a:prstGeom prst="rect">
+            <a:avLst/>
+          </a:prstGeom>
+          <a:ln>
+            <a:noFill/>
+          </a:ln>
+          <a:effectLst>
+            <a:outerShdw blurRad="292100" dist="139700" dir="2700000" algn="tl" rotWithShape="0">
+              <a:srgbClr val="333333">
+                <a:alpha val="65000"/>
+              </a:srgbClr>
+            </a:outerShdw>
+          </a:effectLst>
+        </p:spPr>
+      </p:pic>
+      <p:pic>
+        <p:nvPicPr>
+          <p:cNvPr id="10" name="Picture 9">
+            <a:extLst>
+              <a:ext uri="{FF2B5EF4-FFF2-40B4-BE49-F238E27FC236}">
+                <a16:creationId xmlns:a16="http://schemas.microsoft.com/office/drawing/2014/main" id="{793055B9-A429-295A-C017-DFBEBAAF842A}"/>
+              </a:ext>
+            </a:extLst>
+          </p:cNvPr>
+          <p:cNvPicPr>
+            <a:picLocks noChangeAspect="1"/>
+          </p:cNvPicPr>
+          <p:nvPr/>
+        </p:nvPicPr>
+        <p:blipFill>
+          <a:blip r:embed="rId7"/>
+          <a:stretch>
+            <a:fillRect/>
+          </a:stretch>
+        </p:blipFill>
+        <p:spPr>
+          <a:xfrm>
+            <a:off x="7577417" y="2335368"/>
+            <a:ext cx="4387357" cy="2187264"/>
+          </a:xfrm>
+          <a:prstGeom prst="rect">
+            <a:avLst/>
+          </a:prstGeom>
+          <a:ln>
+            <a:noFill/>
+          </a:ln>
+          <a:effectLst>
+            <a:outerShdw blurRad="292100" dist="139700" dir="2700000" algn="tl" rotWithShape="0">
+              <a:srgbClr val="333333">
+                <a:alpha val="65000"/>
+              </a:srgbClr>
+            </a:outerShdw>
+          </a:effectLst>
+        </p:spPr>
+      </p:pic>
     </p:spTree>
     <p:extLst>
       <p:ext uri="{BB962C8B-B14F-4D97-AF65-F5344CB8AC3E}">

</xml_diff>

<commit_message>
further analyze chapter 03
</commit_message>
<xml_diff>
--- a/GUI_Python/Create_GUI_with_Python.pptx
+++ b/GUI_Python/Create_GUI_with_Python.pptx
@@ -5,18 +5,19 @@
     <p:sldMasterId id="2147483648" r:id="rId1"/>
   </p:sldMasterIdLst>
   <p:notesMasterIdLst>
-    <p:notesMasterId r:id="rId8"/>
+    <p:notesMasterId r:id="rId9"/>
   </p:notesMasterIdLst>
   <p:handoutMasterIdLst>
-    <p:handoutMasterId r:id="rId9"/>
+    <p:handoutMasterId r:id="rId10"/>
   </p:handoutMasterIdLst>
   <p:sldIdLst>
     <p:sldId id="256" r:id="rId2"/>
     <p:sldId id="257" r:id="rId3"/>
     <p:sldId id="258" r:id="rId4"/>
     <p:sldId id="259" r:id="rId5"/>
-    <p:sldId id="261" r:id="rId6"/>
-    <p:sldId id="260" r:id="rId7"/>
+    <p:sldId id="262" r:id="rId6"/>
+    <p:sldId id="261" r:id="rId7"/>
+    <p:sldId id="260" r:id="rId8"/>
   </p:sldIdLst>
   <p:sldSz cx="12192000" cy="6858000"/>
   <p:notesSz cx="6858000" cy="9144000"/>
@@ -784,7 +785,7 @@
           <a:p>
             <a:fld id="{935E2820-AFE1-45FA-949E-17BDB534E1DC}" type="slidenum">
               <a:rPr lang="en-US" smtClean="0"/>
-              <a:t>6</a:t>
+              <a:t>7</a:t>
             </a:fld>
             <a:endParaRPr lang="en-US"/>
           </a:p>
@@ -5978,33 +5979,49 @@
         <p:spPr>
           <a:xfrm>
             <a:off x="2208213" y="304799"/>
-            <a:ext cx="9372600" cy="1649507"/>
+            <a:ext cx="9372600" cy="2384613"/>
           </a:xfrm>
         </p:spPr>
         <p:txBody>
           <a:bodyPr anchor="ctr">
-            <a:normAutofit/>
+            <a:noAutofit/>
           </a:bodyPr>
           <a:lstStyle/>
           <a:p>
             <a:r>
-              <a:rPr lang="en-US" sz="4000" dirty="0">
+              <a:rPr lang="en-US" sz="3200" dirty="0">
                 <a:latin typeface="HarmonyOS Sans Black" panose="00000A00000000000000" pitchFamily="2" charset="0"/>
               </a:rPr>
               <a:t>Create GUI with Python</a:t>
             </a:r>
             <a:br>
-              <a:rPr lang="en-US">
+              <a:rPr lang="en-US" sz="2800" dirty="0">
                 <a:latin typeface="HarmonyOS Sans" panose="00000500000000000000" pitchFamily="2" charset="0"/>
               </a:rPr>
             </a:br>
             <a:r>
-              <a:rPr lang="en-US" sz="5400">
+              <a:rPr lang="en-US" sz="4800" dirty="0">
                 <a:latin typeface="HarmonyOS Sans" panose="00000500000000000000" pitchFamily="2" charset="0"/>
               </a:rPr>
-              <a:t>005 Ch04</a:t>
-            </a:r>
-            <a:endParaRPr lang="en-US" dirty="0">
+              <a:t>005 Ch03 Spy Name Chooser</a:t>
+            </a:r>
+            <a:br>
+              <a:rPr lang="en-US" sz="4800" dirty="0">
+                <a:latin typeface="HarmonyOS Sans" panose="00000500000000000000" pitchFamily="2" charset="0"/>
+              </a:rPr>
+            </a:br>
+            <a:br>
+              <a:rPr lang="en-US" sz="3600" dirty="0">
+                <a:latin typeface="HarmonyOS Sans" panose="00000500000000000000" pitchFamily="2" charset="0"/>
+              </a:rPr>
+            </a:br>
+            <a:r>
+              <a:rPr lang="en-US" sz="3600" dirty="0">
+                <a:latin typeface="HarmonyOS Sans" panose="00000500000000000000" pitchFamily="2" charset="0"/>
+              </a:rPr>
+              <a:t>Addition: use Lambda to transfer argument to function</a:t>
+            </a:r>
+            <a:endParaRPr lang="en-US" sz="2800" dirty="0">
               <a:latin typeface="HarmonyOS Sans" panose="00000500000000000000" pitchFamily="2" charset="0"/>
             </a:endParaRPr>
           </a:p>
@@ -6365,6 +6382,522 @@
       </p:sp>
       <p:pic>
         <p:nvPicPr>
+          <p:cNvPr id="10" name="Picture 9">
+            <a:extLst>
+              <a:ext uri="{FF2B5EF4-FFF2-40B4-BE49-F238E27FC236}">
+                <a16:creationId xmlns:a16="http://schemas.microsoft.com/office/drawing/2014/main" id="{793055B9-A429-295A-C017-DFBEBAAF842A}"/>
+              </a:ext>
+            </a:extLst>
+          </p:cNvPr>
+          <p:cNvPicPr>
+            <a:picLocks noChangeAspect="1"/>
+          </p:cNvPicPr>
+          <p:nvPr/>
+        </p:nvPicPr>
+        <p:blipFill>
+          <a:blip r:embed="rId6"/>
+          <a:stretch>
+            <a:fillRect/>
+          </a:stretch>
+        </p:blipFill>
+        <p:spPr>
+          <a:xfrm>
+            <a:off x="9242612" y="3165530"/>
+            <a:ext cx="2722162" cy="1357101"/>
+          </a:xfrm>
+          <a:prstGeom prst="rect">
+            <a:avLst/>
+          </a:prstGeom>
+          <a:ln>
+            <a:noFill/>
+          </a:ln>
+          <a:effectLst>
+            <a:outerShdw blurRad="292100" dist="139700" dir="2700000" algn="tl" rotWithShape="0">
+              <a:srgbClr val="333333">
+                <a:alpha val="65000"/>
+              </a:srgbClr>
+            </a:outerShdw>
+          </a:effectLst>
+        </p:spPr>
+      </p:pic>
+      <p:pic>
+        <p:nvPicPr>
+          <p:cNvPr id="11" name="Content Placeholder 10">
+            <a:extLst>
+              <a:ext uri="{FF2B5EF4-FFF2-40B4-BE49-F238E27FC236}">
+                <a16:creationId xmlns:a16="http://schemas.microsoft.com/office/drawing/2014/main" id="{83F97D53-343B-B8B7-CE50-6CD803C7620F}"/>
+              </a:ext>
+            </a:extLst>
+          </p:cNvPr>
+          <p:cNvPicPr>
+            <a:picLocks noGrp="1" noChangeAspect="1"/>
+          </p:cNvPicPr>
+          <p:nvPr>
+            <p:ph idx="1"/>
+          </p:nvPr>
+        </p:nvPicPr>
+        <p:blipFill>
+          <a:blip r:embed="rId7"/>
+          <a:stretch>
+            <a:fillRect/>
+          </a:stretch>
+        </p:blipFill>
+        <p:spPr>
+          <a:xfrm>
+            <a:off x="2214787" y="3021106"/>
+            <a:ext cx="6127484" cy="2693894"/>
+          </a:xfrm>
+          <a:prstGeom prst="rect">
+            <a:avLst/>
+          </a:prstGeom>
+          <a:ln>
+            <a:noFill/>
+          </a:ln>
+          <a:effectLst>
+            <a:outerShdw blurRad="292100" dist="139700" dir="2700000" algn="tl" rotWithShape="0">
+              <a:srgbClr val="333333">
+                <a:alpha val="65000"/>
+              </a:srgbClr>
+            </a:outerShdw>
+          </a:effectLst>
+        </p:spPr>
+      </p:pic>
+    </p:spTree>
+    <p:extLst>
+      <p:ext uri="{BB962C8B-B14F-4D97-AF65-F5344CB8AC3E}">
+        <p14:creationId xmlns:p14="http://schemas.microsoft.com/office/powerpoint/2010/main" val="3403620366"/>
+      </p:ext>
+    </p:extLst>
+  </p:cSld>
+  <p:clrMapOvr>
+    <a:masterClrMapping/>
+  </p:clrMapOvr>
+</p:sld>
+</file>
+
+<file path=ppt/slides/slide6.xml><?xml version="1.0" encoding="utf-8"?>
+<p:sld xmlns:a="http://schemas.openxmlformats.org/drawingml/2006/main" xmlns:r="http://schemas.openxmlformats.org/officeDocument/2006/relationships" xmlns:p="http://schemas.openxmlformats.org/presentationml/2006/main">
+  <p:cSld>
+    <p:spTree>
+      <p:nvGrpSpPr>
+        <p:cNvPr id="1" name=""/>
+        <p:cNvGrpSpPr/>
+        <p:nvPr/>
+      </p:nvGrpSpPr>
+      <p:grpSpPr>
+        <a:xfrm>
+          <a:off x="0" y="0"/>
+          <a:ext cx="0" cy="0"/>
+          <a:chOff x="0" y="0"/>
+          <a:chExt cx="0" cy="0"/>
+        </a:xfrm>
+      </p:grpSpPr>
+      <p:sp>
+        <p:nvSpPr>
+          <p:cNvPr id="2" name="Title 1">
+            <a:extLst>
+              <a:ext uri="{FF2B5EF4-FFF2-40B4-BE49-F238E27FC236}">
+                <a16:creationId xmlns:a16="http://schemas.microsoft.com/office/drawing/2014/main" id="{60BDC9E0-4942-655E-4150-9691AA9C765B}"/>
+              </a:ext>
+            </a:extLst>
+          </p:cNvPr>
+          <p:cNvSpPr>
+            <a:spLocks noGrp="1"/>
+          </p:cNvSpPr>
+          <p:nvPr>
+            <p:ph type="title"/>
+          </p:nvPr>
+        </p:nvSpPr>
+        <p:spPr>
+          <a:xfrm>
+            <a:off x="2208213" y="304799"/>
+            <a:ext cx="9372600" cy="1649507"/>
+          </a:xfrm>
+        </p:spPr>
+        <p:txBody>
+          <a:bodyPr anchor="ctr">
+            <a:normAutofit/>
+          </a:bodyPr>
+          <a:lstStyle/>
+          <a:p>
+            <a:r>
+              <a:rPr lang="en-US" sz="4000" dirty="0">
+                <a:latin typeface="HarmonyOS Sans Black" panose="00000A00000000000000" pitchFamily="2" charset="0"/>
+              </a:rPr>
+              <a:t>Create GUI with Python</a:t>
+            </a:r>
+            <a:br>
+              <a:rPr lang="en-US" dirty="0">
+                <a:latin typeface="HarmonyOS Sans" panose="00000500000000000000" pitchFamily="2" charset="0"/>
+              </a:rPr>
+            </a:br>
+            <a:r>
+              <a:rPr lang="en-US" sz="5400" dirty="0">
+                <a:latin typeface="HarmonyOS Sans" panose="00000500000000000000" pitchFamily="2" charset="0"/>
+              </a:rPr>
+              <a:t>006 Ch04 Meme Generator</a:t>
+            </a:r>
+            <a:endParaRPr lang="en-US" dirty="0">
+              <a:latin typeface="HarmonyOS Sans" panose="00000500000000000000" pitchFamily="2" charset="0"/>
+            </a:endParaRPr>
+          </a:p>
+        </p:txBody>
+      </p:sp>
+      <p:pic>
+        <p:nvPicPr>
+          <p:cNvPr id="6" name="Picture 5">
+            <a:extLst>
+              <a:ext uri="{FF2B5EF4-FFF2-40B4-BE49-F238E27FC236}">
+                <a16:creationId xmlns:a16="http://schemas.microsoft.com/office/drawing/2014/main" id="{28525CF1-7DD8-7F22-12CB-14807078F0D7}"/>
+              </a:ext>
+            </a:extLst>
+          </p:cNvPr>
+          <p:cNvPicPr>
+            <a:picLocks noChangeAspect="1"/>
+          </p:cNvPicPr>
+          <p:nvPr/>
+        </p:nvPicPr>
+        <p:blipFill>
+          <a:blip r:embed="rId2"/>
+          <a:stretch>
+            <a:fillRect/>
+          </a:stretch>
+        </p:blipFill>
+        <p:spPr>
+          <a:xfrm>
+            <a:off x="119268" y="59634"/>
+            <a:ext cx="611187" cy="671551"/>
+          </a:xfrm>
+          <a:prstGeom prst="rect">
+            <a:avLst/>
+          </a:prstGeom>
+          <a:ln>
+            <a:noFill/>
+          </a:ln>
+          <a:effectLst>
+            <a:outerShdw blurRad="292100" dist="139700" dir="2700000" algn="tl" rotWithShape="0">
+              <a:srgbClr val="333333">
+                <a:alpha val="65000"/>
+              </a:srgbClr>
+            </a:outerShdw>
+          </a:effectLst>
+        </p:spPr>
+      </p:pic>
+      <p:pic>
+        <p:nvPicPr>
+          <p:cNvPr id="7" name="Picture 6">
+            <a:extLst>
+              <a:ext uri="{FF2B5EF4-FFF2-40B4-BE49-F238E27FC236}">
+                <a16:creationId xmlns:a16="http://schemas.microsoft.com/office/drawing/2014/main" id="{ACE06191-4455-E539-6992-17D338C10648}"/>
+              </a:ext>
+            </a:extLst>
+          </p:cNvPr>
+          <p:cNvPicPr>
+            <a:picLocks noChangeAspect="1"/>
+          </p:cNvPicPr>
+          <p:nvPr/>
+        </p:nvPicPr>
+        <p:blipFill>
+          <a:blip r:embed="rId3"/>
+          <a:stretch>
+            <a:fillRect/>
+          </a:stretch>
+        </p:blipFill>
+        <p:spPr>
+          <a:xfrm>
+            <a:off x="0" y="6471564"/>
+            <a:ext cx="1855694" cy="386435"/>
+          </a:xfrm>
+          <a:prstGeom prst="rect">
+            <a:avLst/>
+          </a:prstGeom>
+          <a:ln>
+            <a:noFill/>
+          </a:ln>
+          <a:effectLst>
+            <a:outerShdw blurRad="292100" dist="139700" dir="2700000" algn="tl" rotWithShape="0">
+              <a:srgbClr val="333333">
+                <a:alpha val="65000"/>
+              </a:srgbClr>
+            </a:outerShdw>
+          </a:effectLst>
+        </p:spPr>
+      </p:pic>
+      <p:pic>
+        <p:nvPicPr>
+          <p:cNvPr id="8" name="Picture 7">
+            <a:extLst>
+              <a:ext uri="{FF2B5EF4-FFF2-40B4-BE49-F238E27FC236}">
+                <a16:creationId xmlns:a16="http://schemas.microsoft.com/office/drawing/2014/main" id="{E815D6CC-086C-CEEA-B605-CC7A17A0C652}"/>
+              </a:ext>
+            </a:extLst>
+          </p:cNvPr>
+          <p:cNvPicPr>
+            <a:picLocks noChangeAspect="1"/>
+          </p:cNvPicPr>
+          <p:nvPr/>
+        </p:nvPicPr>
+        <p:blipFill>
+          <a:blip r:embed="rId4"/>
+          <a:stretch>
+            <a:fillRect/>
+          </a:stretch>
+        </p:blipFill>
+        <p:spPr>
+          <a:xfrm>
+            <a:off x="119268" y="863897"/>
+            <a:ext cx="1374374" cy="2071274"/>
+          </a:xfrm>
+          <a:prstGeom prst="rect">
+            <a:avLst/>
+          </a:prstGeom>
+          <a:ln>
+            <a:noFill/>
+          </a:ln>
+          <a:effectLst>
+            <a:outerShdw blurRad="292100" dist="139700" dir="2700000" algn="tl" rotWithShape="0">
+              <a:srgbClr val="333333">
+                <a:alpha val="65000"/>
+              </a:srgbClr>
+            </a:outerShdw>
+          </a:effectLst>
+        </p:spPr>
+      </p:pic>
+      <p:sp>
+        <p:nvSpPr>
+          <p:cNvPr id="9" name="Subtitle 5">
+            <a:extLst>
+              <a:ext uri="{FF2B5EF4-FFF2-40B4-BE49-F238E27FC236}">
+                <a16:creationId xmlns:a16="http://schemas.microsoft.com/office/drawing/2014/main" id="{B98C3EDB-7ABC-5858-0198-A6F89107DC04}"/>
+              </a:ext>
+            </a:extLst>
+          </p:cNvPr>
+          <p:cNvSpPr txBox="1">
+            <a:spLocks/>
+          </p:cNvSpPr>
+          <p:nvPr/>
+        </p:nvSpPr>
+        <p:spPr>
+          <a:xfrm>
+            <a:off x="2747347" y="6471564"/>
+            <a:ext cx="7704856" cy="367591"/>
+          </a:xfrm>
+          <a:prstGeom prst="rect">
+            <a:avLst/>
+          </a:prstGeom>
+        </p:spPr>
+        <p:txBody>
+          <a:bodyPr vert="horz" lIns="91440" tIns="45720" rIns="91440" bIns="45720" rtlCol="0">
+            <a:normAutofit lnSpcReduction="10000"/>
+          </a:bodyPr>
+          <a:lstStyle>
+            <a:lvl1pPr marL="0" indent="0" algn="l" defTabSz="914400" rtl="0" eaLnBrk="1" latinLnBrk="0" hangingPunct="1">
+              <a:lnSpc>
+                <a:spcPct val="90000"/>
+              </a:lnSpc>
+              <a:spcBef>
+                <a:spcPts val="0"/>
+              </a:spcBef>
+              <a:buSzPct val="80000"/>
+              <a:buFont typeface="Wingdings" panose="05000000000000000000" pitchFamily="2" charset="2"/>
+              <a:buNone/>
+              <a:defRPr sz="2400" kern="1200">
+                <a:solidFill>
+                  <a:schemeClr val="accent2"/>
+                </a:solidFill>
+                <a:latin typeface="+mn-lt"/>
+                <a:ea typeface="+mn-ea"/>
+                <a:cs typeface="+mn-cs"/>
+              </a:defRPr>
+            </a:lvl1pPr>
+            <a:lvl2pPr marL="457200" indent="0" algn="ctr" defTabSz="914400" rtl="0" eaLnBrk="1" latinLnBrk="0" hangingPunct="1">
+              <a:lnSpc>
+                <a:spcPct val="90000"/>
+              </a:lnSpc>
+              <a:spcBef>
+                <a:spcPts val="1000"/>
+              </a:spcBef>
+              <a:buSzPct val="80000"/>
+              <a:buFont typeface="Wingdings" panose="05000000000000000000" pitchFamily="2" charset="2"/>
+              <a:buNone/>
+              <a:defRPr sz="2000" kern="1200">
+                <a:solidFill>
+                  <a:schemeClr val="tx1"/>
+                </a:solidFill>
+                <a:latin typeface="+mn-lt"/>
+                <a:ea typeface="+mn-ea"/>
+                <a:cs typeface="+mn-cs"/>
+              </a:defRPr>
+            </a:lvl2pPr>
+            <a:lvl3pPr marL="914400" indent="0" algn="ctr" defTabSz="914400" rtl="0" eaLnBrk="1" latinLnBrk="0" hangingPunct="1">
+              <a:lnSpc>
+                <a:spcPct val="90000"/>
+              </a:lnSpc>
+              <a:spcBef>
+                <a:spcPts val="800"/>
+              </a:spcBef>
+              <a:buSzPct val="80000"/>
+              <a:buFont typeface="Wingdings" panose="05000000000000000000" pitchFamily="2" charset="2"/>
+              <a:buNone/>
+              <a:defRPr sz="1800" kern="1200">
+                <a:solidFill>
+                  <a:schemeClr val="tx1"/>
+                </a:solidFill>
+                <a:latin typeface="+mn-lt"/>
+                <a:ea typeface="+mn-ea"/>
+                <a:cs typeface="+mn-cs"/>
+              </a:defRPr>
+            </a:lvl3pPr>
+            <a:lvl4pPr marL="1371600" indent="0" algn="ctr" defTabSz="914400" rtl="0" eaLnBrk="1" latinLnBrk="0" hangingPunct="1">
+              <a:lnSpc>
+                <a:spcPct val="90000"/>
+              </a:lnSpc>
+              <a:spcBef>
+                <a:spcPts val="800"/>
+              </a:spcBef>
+              <a:buSzPct val="80000"/>
+              <a:buFont typeface="Wingdings" panose="05000000000000000000" pitchFamily="2" charset="2"/>
+              <a:buNone/>
+              <a:defRPr sz="1600" kern="1200">
+                <a:solidFill>
+                  <a:schemeClr val="tx1"/>
+                </a:solidFill>
+                <a:latin typeface="+mn-lt"/>
+                <a:ea typeface="+mn-ea"/>
+                <a:cs typeface="+mn-cs"/>
+              </a:defRPr>
+            </a:lvl4pPr>
+            <a:lvl5pPr marL="1828800" indent="0" algn="ctr" defTabSz="914400" rtl="0" eaLnBrk="1" latinLnBrk="0" hangingPunct="1">
+              <a:lnSpc>
+                <a:spcPct val="90000"/>
+              </a:lnSpc>
+              <a:spcBef>
+                <a:spcPts val="800"/>
+              </a:spcBef>
+              <a:buSzPct val="80000"/>
+              <a:buFont typeface="Wingdings" panose="05000000000000000000" pitchFamily="2" charset="2"/>
+              <a:buNone/>
+              <a:defRPr sz="1600" kern="1200">
+                <a:solidFill>
+                  <a:schemeClr val="tx1"/>
+                </a:solidFill>
+                <a:latin typeface="+mn-lt"/>
+                <a:ea typeface="+mn-ea"/>
+                <a:cs typeface="+mn-cs"/>
+              </a:defRPr>
+            </a:lvl5pPr>
+            <a:lvl6pPr marL="2286000" indent="0" algn="ctr" defTabSz="914400" rtl="0" eaLnBrk="1" latinLnBrk="0" hangingPunct="1">
+              <a:lnSpc>
+                <a:spcPct val="90000"/>
+              </a:lnSpc>
+              <a:spcBef>
+                <a:spcPts val="800"/>
+              </a:spcBef>
+              <a:buSzPct val="80000"/>
+              <a:buFont typeface="Wingdings" panose="05000000000000000000" pitchFamily="2" charset="2"/>
+              <a:buNone/>
+              <a:defRPr sz="1600" kern="1200">
+                <a:solidFill>
+                  <a:schemeClr val="tx1"/>
+                </a:solidFill>
+                <a:latin typeface="+mn-lt"/>
+                <a:ea typeface="+mn-ea"/>
+                <a:cs typeface="+mn-cs"/>
+              </a:defRPr>
+            </a:lvl6pPr>
+            <a:lvl7pPr marL="2743200" indent="0" algn="ctr" defTabSz="914400" rtl="0" eaLnBrk="1" latinLnBrk="0" hangingPunct="1">
+              <a:lnSpc>
+                <a:spcPct val="90000"/>
+              </a:lnSpc>
+              <a:spcBef>
+                <a:spcPts val="800"/>
+              </a:spcBef>
+              <a:buSzPct val="80000"/>
+              <a:buFont typeface="Wingdings" panose="05000000000000000000" pitchFamily="2" charset="2"/>
+              <a:buNone/>
+              <a:defRPr sz="1600" kern="1200">
+                <a:solidFill>
+                  <a:schemeClr val="tx1"/>
+                </a:solidFill>
+                <a:latin typeface="+mn-lt"/>
+                <a:ea typeface="+mn-ea"/>
+                <a:cs typeface="+mn-cs"/>
+              </a:defRPr>
+            </a:lvl7pPr>
+            <a:lvl8pPr marL="3200400" indent="0" algn="ctr" defTabSz="914400" rtl="0" eaLnBrk="1" latinLnBrk="0" hangingPunct="1">
+              <a:lnSpc>
+                <a:spcPct val="90000"/>
+              </a:lnSpc>
+              <a:spcBef>
+                <a:spcPts val="800"/>
+              </a:spcBef>
+              <a:buSzPct val="80000"/>
+              <a:buFont typeface="Wingdings" panose="05000000000000000000" pitchFamily="2" charset="2"/>
+              <a:buNone/>
+              <a:defRPr sz="1600" kern="1200">
+                <a:solidFill>
+                  <a:schemeClr val="tx1"/>
+                </a:solidFill>
+                <a:latin typeface="+mn-lt"/>
+                <a:ea typeface="+mn-ea"/>
+                <a:cs typeface="+mn-cs"/>
+              </a:defRPr>
+            </a:lvl8pPr>
+            <a:lvl9pPr marL="3657600" indent="0" algn="ctr" defTabSz="914400" rtl="0" eaLnBrk="1" latinLnBrk="0" hangingPunct="1">
+              <a:lnSpc>
+                <a:spcPct val="90000"/>
+              </a:lnSpc>
+              <a:spcBef>
+                <a:spcPts val="800"/>
+              </a:spcBef>
+              <a:buSzPct val="80000"/>
+              <a:buFont typeface="Wingdings" panose="05000000000000000000" pitchFamily="2" charset="2"/>
+              <a:buNone/>
+              <a:defRPr sz="1600" kern="1200">
+                <a:solidFill>
+                  <a:schemeClr val="tx1"/>
+                </a:solidFill>
+                <a:latin typeface="+mn-lt"/>
+                <a:ea typeface="+mn-ea"/>
+                <a:cs typeface="+mn-cs"/>
+              </a:defRPr>
+            </a:lvl9pPr>
+          </a:lstStyle>
+          <a:p>
+            <a:pPr>
+              <a:lnSpc>
+                <a:spcPct val="120000"/>
+              </a:lnSpc>
+            </a:pPr>
+            <a:r>
+              <a:rPr lang="en-US" sz="1800" b="1" dirty="0">
+                <a:solidFill>
+                  <a:schemeClr val="accent2">
+                    <a:lumMod val="75000"/>
+                  </a:schemeClr>
+                </a:solidFill>
+                <a:hlinkClick r:id="rId5">
+                  <a:extLst>
+                    <a:ext uri="{A12FA001-AC4F-418D-AE19-62706E023703}">
+                      <ahyp:hlinkClr xmlns:ahyp="http://schemas.microsoft.com/office/drawing/2018/hyperlinkcolor" val="tx"/>
+                    </a:ext>
+                  </a:extLst>
+                </a:hlinkClick>
+              </a:rPr>
+              <a:t>https://github.com/yasenstar/python/tree/master/GUI_Python</a:t>
+            </a:r>
+            <a:endParaRPr lang="en-US" sz="1800" b="1" dirty="0">
+              <a:solidFill>
+                <a:schemeClr val="accent2">
+                  <a:lumMod val="75000"/>
+                </a:schemeClr>
+              </a:solidFill>
+            </a:endParaRPr>
+          </a:p>
+        </p:txBody>
+      </p:sp>
+      <p:pic>
+        <p:nvPicPr>
           <p:cNvPr id="13" name="Content Placeholder 12">
             <a:extLst>
               <a:ext uri="{FF2B5EF4-FFF2-40B4-BE49-F238E27FC236}">
@@ -6458,7 +6991,7 @@
 </p:sld>
 </file>
 
-<file path=ppt/slides/slide6.xml><?xml version="1.0" encoding="utf-8"?>
+<file path=ppt/slides/slide7.xml><?xml version="1.0" encoding="utf-8"?>
 <p:sld xmlns:a="http://schemas.openxmlformats.org/drawingml/2006/main" xmlns:r="http://schemas.openxmlformats.org/officeDocument/2006/relationships" xmlns:p="http://schemas.openxmlformats.org/presentationml/2006/main">
   <p:cSld>
     <p:spTree>

</xml_diff>

<commit_message>
additional 2 for ch03
</commit_message>
<xml_diff>
--- a/GUI_Python/Create_GUI_with_Python.pptx
+++ b/GUI_Python/Create_GUI_with_Python.pptx
@@ -5,10 +5,10 @@
     <p:sldMasterId id="2147483648" r:id="rId1"/>
   </p:sldMasterIdLst>
   <p:notesMasterIdLst>
-    <p:notesMasterId r:id="rId9"/>
+    <p:notesMasterId r:id="rId10"/>
   </p:notesMasterIdLst>
   <p:handoutMasterIdLst>
-    <p:handoutMasterId r:id="rId10"/>
+    <p:handoutMasterId r:id="rId11"/>
   </p:handoutMasterIdLst>
   <p:sldIdLst>
     <p:sldId id="256" r:id="rId2"/>
@@ -16,8 +16,9 @@
     <p:sldId id="258" r:id="rId4"/>
     <p:sldId id="259" r:id="rId5"/>
     <p:sldId id="262" r:id="rId6"/>
-    <p:sldId id="261" r:id="rId7"/>
-    <p:sldId id="260" r:id="rId8"/>
+    <p:sldId id="263" r:id="rId7"/>
+    <p:sldId id="261" r:id="rId8"/>
+    <p:sldId id="260" r:id="rId9"/>
   </p:sldIdLst>
   <p:sldSz cx="12192000" cy="6858000"/>
   <p:notesSz cx="6858000" cy="9144000"/>
@@ -785,7 +786,7 @@
           <a:p>
             <a:fld id="{935E2820-AFE1-45FA-949E-17BDB534E1DC}" type="slidenum">
               <a:rPr lang="en-US" smtClean="0"/>
-              <a:t>7</a:t>
+              <a:t>8</a:t>
             </a:fld>
             <a:endParaRPr lang="en-US"/>
           </a:p>
@@ -6019,7 +6020,7 @@
               <a:rPr lang="en-US" sz="3600" dirty="0">
                 <a:latin typeface="HarmonyOS Sans" panose="00000500000000000000" pitchFamily="2" charset="0"/>
               </a:rPr>
-              <a:t>Addition: use Lambda to transfer argument to function</a:t>
+              <a:t>Addition 1: use Lambda to transfer argument to function</a:t>
             </a:r>
             <a:endParaRPr lang="en-US" sz="2800" dirty="0">
               <a:latin typeface="HarmonyOS Sans" panose="00000500000000000000" pitchFamily="2" charset="0"/>
@@ -6511,33 +6512,49 @@
         <p:spPr>
           <a:xfrm>
             <a:off x="2208213" y="304799"/>
-            <a:ext cx="9372600" cy="1649507"/>
+            <a:ext cx="9372600" cy="2384613"/>
           </a:xfrm>
         </p:spPr>
         <p:txBody>
           <a:bodyPr anchor="ctr">
-            <a:normAutofit/>
+            <a:noAutofit/>
           </a:bodyPr>
           <a:lstStyle/>
           <a:p>
             <a:r>
-              <a:rPr lang="en-US" sz="4000" dirty="0">
+              <a:rPr lang="en-US" sz="3200" dirty="0">
                 <a:latin typeface="HarmonyOS Sans Black" panose="00000A00000000000000" pitchFamily="2" charset="0"/>
               </a:rPr>
               <a:t>Create GUI with Python</a:t>
             </a:r>
             <a:br>
-              <a:rPr lang="en-US" dirty="0">
+              <a:rPr lang="en-US" sz="2800" dirty="0">
                 <a:latin typeface="HarmonyOS Sans" panose="00000500000000000000" pitchFamily="2" charset="0"/>
               </a:rPr>
             </a:br>
             <a:r>
-              <a:rPr lang="en-US" sz="5400" dirty="0">
+              <a:rPr lang="en-US" sz="4800" dirty="0">
                 <a:latin typeface="HarmonyOS Sans" panose="00000500000000000000" pitchFamily="2" charset="0"/>
               </a:rPr>
-              <a:t>006 Ch04 Meme Generator</a:t>
-            </a:r>
-            <a:endParaRPr lang="en-US" dirty="0">
+              <a:t>006 Ch03 Spy Name Chooser</a:t>
+            </a:r>
+            <a:br>
+              <a:rPr lang="en-US" sz="4800" dirty="0">
+                <a:latin typeface="HarmonyOS Sans" panose="00000500000000000000" pitchFamily="2" charset="0"/>
+              </a:rPr>
+            </a:br>
+            <a:br>
+              <a:rPr lang="en-US" sz="3600" dirty="0">
+                <a:latin typeface="HarmonyOS Sans" panose="00000500000000000000" pitchFamily="2" charset="0"/>
+              </a:rPr>
+            </a:br>
+            <a:r>
+              <a:rPr lang="en-US" sz="3600" dirty="0">
+                <a:latin typeface="HarmonyOS Sans" panose="00000500000000000000" pitchFamily="2" charset="0"/>
+              </a:rPr>
+              <a:t>Addition 2: More Investigation on “Commands”</a:t>
+            </a:r>
+            <a:endParaRPr lang="en-US" sz="2800" dirty="0">
               <a:latin typeface="HarmonyOS Sans" panose="00000500000000000000" pitchFamily="2" charset="0"/>
             </a:endParaRPr>
           </a:p>
@@ -6898,19 +6915,17 @@
       </p:sp>
       <p:pic>
         <p:nvPicPr>
-          <p:cNvPr id="13" name="Content Placeholder 12">
+          <p:cNvPr id="10" name="Picture 9">
             <a:extLst>
               <a:ext uri="{FF2B5EF4-FFF2-40B4-BE49-F238E27FC236}">
-                <a16:creationId xmlns:a16="http://schemas.microsoft.com/office/drawing/2014/main" id="{61CE23D5-81B1-20F1-E2BC-4C6589C428E9}"/>
+                <a16:creationId xmlns:a16="http://schemas.microsoft.com/office/drawing/2014/main" id="{793055B9-A429-295A-C017-DFBEBAAF842A}"/>
               </a:ext>
             </a:extLst>
           </p:cNvPr>
           <p:cNvPicPr>
-            <a:picLocks noGrp="1" noChangeAspect="1"/>
+            <a:picLocks noChangeAspect="1"/>
           </p:cNvPicPr>
-          <p:nvPr>
-            <p:ph idx="1"/>
-          </p:nvPr>
+          <p:nvPr/>
         </p:nvPicPr>
         <p:blipFill>
           <a:blip r:embed="rId6"/>
@@ -6920,8 +6935,8 @@
         </p:blipFill>
         <p:spPr>
           <a:xfrm>
-            <a:off x="2039693" y="1713322"/>
-            <a:ext cx="5411017" cy="4114800"/>
+            <a:off x="9242612" y="3165530"/>
+            <a:ext cx="2722162" cy="1357101"/>
           </a:xfrm>
           <a:prstGeom prst="rect">
             <a:avLst/>
@@ -6940,17 +6955,19 @@
       </p:pic>
       <p:pic>
         <p:nvPicPr>
-          <p:cNvPr id="10" name="Picture 9">
+          <p:cNvPr id="12" name="Content Placeholder 11">
             <a:extLst>
               <a:ext uri="{FF2B5EF4-FFF2-40B4-BE49-F238E27FC236}">
-                <a16:creationId xmlns:a16="http://schemas.microsoft.com/office/drawing/2014/main" id="{793055B9-A429-295A-C017-DFBEBAAF842A}"/>
+                <a16:creationId xmlns:a16="http://schemas.microsoft.com/office/drawing/2014/main" id="{BC9DEB89-DB11-AD10-11CB-DA18273674ED}"/>
               </a:ext>
             </a:extLst>
           </p:cNvPr>
           <p:cNvPicPr>
-            <a:picLocks noChangeAspect="1"/>
+            <a:picLocks noGrp="1" noChangeAspect="1"/>
           </p:cNvPicPr>
-          <p:nvPr/>
+          <p:nvPr>
+            <p:ph idx="1"/>
+          </p:nvPr>
         </p:nvPicPr>
         <p:blipFill>
           <a:blip r:embed="rId7"/>
@@ -6960,8 +6977,8 @@
         </p:blipFill>
         <p:spPr>
           <a:xfrm>
-            <a:off x="7577417" y="2335368"/>
-            <a:ext cx="4387357" cy="2187264"/>
+            <a:off x="2687831" y="2894411"/>
+            <a:ext cx="4996863" cy="2926976"/>
           </a:xfrm>
           <a:prstGeom prst="rect">
             <a:avLst/>
@@ -6981,6 +6998,523 @@
     </p:spTree>
     <p:extLst>
       <p:ext uri="{BB962C8B-B14F-4D97-AF65-F5344CB8AC3E}">
+        <p14:creationId xmlns:p14="http://schemas.microsoft.com/office/powerpoint/2010/main" val="519624687"/>
+      </p:ext>
+    </p:extLst>
+  </p:cSld>
+  <p:clrMapOvr>
+    <a:masterClrMapping/>
+  </p:clrMapOvr>
+</p:sld>
+</file>
+
+<file path=ppt/slides/slide7.xml><?xml version="1.0" encoding="utf-8"?>
+<p:sld xmlns:a="http://schemas.openxmlformats.org/drawingml/2006/main" xmlns:r="http://schemas.openxmlformats.org/officeDocument/2006/relationships" xmlns:p="http://schemas.openxmlformats.org/presentationml/2006/main">
+  <p:cSld>
+    <p:spTree>
+      <p:nvGrpSpPr>
+        <p:cNvPr id="1" name=""/>
+        <p:cNvGrpSpPr/>
+        <p:nvPr/>
+      </p:nvGrpSpPr>
+      <p:grpSpPr>
+        <a:xfrm>
+          <a:off x="0" y="0"/>
+          <a:ext cx="0" cy="0"/>
+          <a:chOff x="0" y="0"/>
+          <a:chExt cx="0" cy="0"/>
+        </a:xfrm>
+      </p:grpSpPr>
+      <p:sp>
+        <p:nvSpPr>
+          <p:cNvPr id="2" name="Title 1">
+            <a:extLst>
+              <a:ext uri="{FF2B5EF4-FFF2-40B4-BE49-F238E27FC236}">
+                <a16:creationId xmlns:a16="http://schemas.microsoft.com/office/drawing/2014/main" id="{60BDC9E0-4942-655E-4150-9691AA9C765B}"/>
+              </a:ext>
+            </a:extLst>
+          </p:cNvPr>
+          <p:cNvSpPr>
+            <a:spLocks noGrp="1"/>
+          </p:cNvSpPr>
+          <p:nvPr>
+            <p:ph type="title"/>
+          </p:nvPr>
+        </p:nvSpPr>
+        <p:spPr>
+          <a:xfrm>
+            <a:off x="2208213" y="304799"/>
+            <a:ext cx="9372600" cy="1649507"/>
+          </a:xfrm>
+        </p:spPr>
+        <p:txBody>
+          <a:bodyPr anchor="ctr">
+            <a:normAutofit/>
+          </a:bodyPr>
+          <a:lstStyle/>
+          <a:p>
+            <a:r>
+              <a:rPr lang="en-US" sz="4000" dirty="0">
+                <a:latin typeface="HarmonyOS Sans Black" panose="00000A00000000000000" pitchFamily="2" charset="0"/>
+              </a:rPr>
+              <a:t>Create GUI with Python</a:t>
+            </a:r>
+            <a:br>
+              <a:rPr lang="en-US">
+                <a:latin typeface="HarmonyOS Sans" panose="00000500000000000000" pitchFamily="2" charset="0"/>
+              </a:rPr>
+            </a:br>
+            <a:r>
+              <a:rPr lang="en-US" sz="5400">
+                <a:latin typeface="HarmonyOS Sans" panose="00000500000000000000" pitchFamily="2" charset="0"/>
+              </a:rPr>
+              <a:t>00</a:t>
+            </a:r>
+            <a:r>
+              <a:rPr lang="en-US" sz="5400" dirty="0">
+                <a:latin typeface="HarmonyOS Sans" panose="00000500000000000000" pitchFamily="2" charset="0"/>
+              </a:rPr>
+              <a:t>7</a:t>
+            </a:r>
+            <a:r>
+              <a:rPr lang="en-US" sz="5400">
+                <a:latin typeface="HarmonyOS Sans" panose="00000500000000000000" pitchFamily="2" charset="0"/>
+              </a:rPr>
+              <a:t> </a:t>
+            </a:r>
+            <a:r>
+              <a:rPr lang="en-US" sz="5400" dirty="0">
+                <a:latin typeface="HarmonyOS Sans" panose="00000500000000000000" pitchFamily="2" charset="0"/>
+              </a:rPr>
+              <a:t>Ch04 Meme Generator</a:t>
+            </a:r>
+            <a:endParaRPr lang="en-US" dirty="0">
+              <a:latin typeface="HarmonyOS Sans" panose="00000500000000000000" pitchFamily="2" charset="0"/>
+            </a:endParaRPr>
+          </a:p>
+        </p:txBody>
+      </p:sp>
+      <p:pic>
+        <p:nvPicPr>
+          <p:cNvPr id="6" name="Picture 5">
+            <a:extLst>
+              <a:ext uri="{FF2B5EF4-FFF2-40B4-BE49-F238E27FC236}">
+                <a16:creationId xmlns:a16="http://schemas.microsoft.com/office/drawing/2014/main" id="{28525CF1-7DD8-7F22-12CB-14807078F0D7}"/>
+              </a:ext>
+            </a:extLst>
+          </p:cNvPr>
+          <p:cNvPicPr>
+            <a:picLocks noChangeAspect="1"/>
+          </p:cNvPicPr>
+          <p:nvPr/>
+        </p:nvPicPr>
+        <p:blipFill>
+          <a:blip r:embed="rId2"/>
+          <a:stretch>
+            <a:fillRect/>
+          </a:stretch>
+        </p:blipFill>
+        <p:spPr>
+          <a:xfrm>
+            <a:off x="119268" y="59634"/>
+            <a:ext cx="611187" cy="671551"/>
+          </a:xfrm>
+          <a:prstGeom prst="rect">
+            <a:avLst/>
+          </a:prstGeom>
+          <a:ln>
+            <a:noFill/>
+          </a:ln>
+          <a:effectLst>
+            <a:outerShdw blurRad="292100" dist="139700" dir="2700000" algn="tl" rotWithShape="0">
+              <a:srgbClr val="333333">
+                <a:alpha val="65000"/>
+              </a:srgbClr>
+            </a:outerShdw>
+          </a:effectLst>
+        </p:spPr>
+      </p:pic>
+      <p:pic>
+        <p:nvPicPr>
+          <p:cNvPr id="7" name="Picture 6">
+            <a:extLst>
+              <a:ext uri="{FF2B5EF4-FFF2-40B4-BE49-F238E27FC236}">
+                <a16:creationId xmlns:a16="http://schemas.microsoft.com/office/drawing/2014/main" id="{ACE06191-4455-E539-6992-17D338C10648}"/>
+              </a:ext>
+            </a:extLst>
+          </p:cNvPr>
+          <p:cNvPicPr>
+            <a:picLocks noChangeAspect="1"/>
+          </p:cNvPicPr>
+          <p:nvPr/>
+        </p:nvPicPr>
+        <p:blipFill>
+          <a:blip r:embed="rId3"/>
+          <a:stretch>
+            <a:fillRect/>
+          </a:stretch>
+        </p:blipFill>
+        <p:spPr>
+          <a:xfrm>
+            <a:off x="0" y="6471564"/>
+            <a:ext cx="1855694" cy="386435"/>
+          </a:xfrm>
+          <a:prstGeom prst="rect">
+            <a:avLst/>
+          </a:prstGeom>
+          <a:ln>
+            <a:noFill/>
+          </a:ln>
+          <a:effectLst>
+            <a:outerShdw blurRad="292100" dist="139700" dir="2700000" algn="tl" rotWithShape="0">
+              <a:srgbClr val="333333">
+                <a:alpha val="65000"/>
+              </a:srgbClr>
+            </a:outerShdw>
+          </a:effectLst>
+        </p:spPr>
+      </p:pic>
+      <p:pic>
+        <p:nvPicPr>
+          <p:cNvPr id="8" name="Picture 7">
+            <a:extLst>
+              <a:ext uri="{FF2B5EF4-FFF2-40B4-BE49-F238E27FC236}">
+                <a16:creationId xmlns:a16="http://schemas.microsoft.com/office/drawing/2014/main" id="{E815D6CC-086C-CEEA-B605-CC7A17A0C652}"/>
+              </a:ext>
+            </a:extLst>
+          </p:cNvPr>
+          <p:cNvPicPr>
+            <a:picLocks noChangeAspect="1"/>
+          </p:cNvPicPr>
+          <p:nvPr/>
+        </p:nvPicPr>
+        <p:blipFill>
+          <a:blip r:embed="rId4"/>
+          <a:stretch>
+            <a:fillRect/>
+          </a:stretch>
+        </p:blipFill>
+        <p:spPr>
+          <a:xfrm>
+            <a:off x="119268" y="863897"/>
+            <a:ext cx="1374374" cy="2071274"/>
+          </a:xfrm>
+          <a:prstGeom prst="rect">
+            <a:avLst/>
+          </a:prstGeom>
+          <a:ln>
+            <a:noFill/>
+          </a:ln>
+          <a:effectLst>
+            <a:outerShdw blurRad="292100" dist="139700" dir="2700000" algn="tl" rotWithShape="0">
+              <a:srgbClr val="333333">
+                <a:alpha val="65000"/>
+              </a:srgbClr>
+            </a:outerShdw>
+          </a:effectLst>
+        </p:spPr>
+      </p:pic>
+      <p:sp>
+        <p:nvSpPr>
+          <p:cNvPr id="9" name="Subtitle 5">
+            <a:extLst>
+              <a:ext uri="{FF2B5EF4-FFF2-40B4-BE49-F238E27FC236}">
+                <a16:creationId xmlns:a16="http://schemas.microsoft.com/office/drawing/2014/main" id="{B98C3EDB-7ABC-5858-0198-A6F89107DC04}"/>
+              </a:ext>
+            </a:extLst>
+          </p:cNvPr>
+          <p:cNvSpPr txBox="1">
+            <a:spLocks/>
+          </p:cNvSpPr>
+          <p:nvPr/>
+        </p:nvSpPr>
+        <p:spPr>
+          <a:xfrm>
+            <a:off x="2747347" y="6471564"/>
+            <a:ext cx="7704856" cy="367591"/>
+          </a:xfrm>
+          <a:prstGeom prst="rect">
+            <a:avLst/>
+          </a:prstGeom>
+        </p:spPr>
+        <p:txBody>
+          <a:bodyPr vert="horz" lIns="91440" tIns="45720" rIns="91440" bIns="45720" rtlCol="0">
+            <a:normAutofit lnSpcReduction="10000"/>
+          </a:bodyPr>
+          <a:lstStyle>
+            <a:lvl1pPr marL="0" indent="0" algn="l" defTabSz="914400" rtl="0" eaLnBrk="1" latinLnBrk="0" hangingPunct="1">
+              <a:lnSpc>
+                <a:spcPct val="90000"/>
+              </a:lnSpc>
+              <a:spcBef>
+                <a:spcPts val="0"/>
+              </a:spcBef>
+              <a:buSzPct val="80000"/>
+              <a:buFont typeface="Wingdings" panose="05000000000000000000" pitchFamily="2" charset="2"/>
+              <a:buNone/>
+              <a:defRPr sz="2400" kern="1200">
+                <a:solidFill>
+                  <a:schemeClr val="accent2"/>
+                </a:solidFill>
+                <a:latin typeface="+mn-lt"/>
+                <a:ea typeface="+mn-ea"/>
+                <a:cs typeface="+mn-cs"/>
+              </a:defRPr>
+            </a:lvl1pPr>
+            <a:lvl2pPr marL="457200" indent="0" algn="ctr" defTabSz="914400" rtl="0" eaLnBrk="1" latinLnBrk="0" hangingPunct="1">
+              <a:lnSpc>
+                <a:spcPct val="90000"/>
+              </a:lnSpc>
+              <a:spcBef>
+                <a:spcPts val="1000"/>
+              </a:spcBef>
+              <a:buSzPct val="80000"/>
+              <a:buFont typeface="Wingdings" panose="05000000000000000000" pitchFamily="2" charset="2"/>
+              <a:buNone/>
+              <a:defRPr sz="2000" kern="1200">
+                <a:solidFill>
+                  <a:schemeClr val="tx1"/>
+                </a:solidFill>
+                <a:latin typeface="+mn-lt"/>
+                <a:ea typeface="+mn-ea"/>
+                <a:cs typeface="+mn-cs"/>
+              </a:defRPr>
+            </a:lvl2pPr>
+            <a:lvl3pPr marL="914400" indent="0" algn="ctr" defTabSz="914400" rtl="0" eaLnBrk="1" latinLnBrk="0" hangingPunct="1">
+              <a:lnSpc>
+                <a:spcPct val="90000"/>
+              </a:lnSpc>
+              <a:spcBef>
+                <a:spcPts val="800"/>
+              </a:spcBef>
+              <a:buSzPct val="80000"/>
+              <a:buFont typeface="Wingdings" panose="05000000000000000000" pitchFamily="2" charset="2"/>
+              <a:buNone/>
+              <a:defRPr sz="1800" kern="1200">
+                <a:solidFill>
+                  <a:schemeClr val="tx1"/>
+                </a:solidFill>
+                <a:latin typeface="+mn-lt"/>
+                <a:ea typeface="+mn-ea"/>
+                <a:cs typeface="+mn-cs"/>
+              </a:defRPr>
+            </a:lvl3pPr>
+            <a:lvl4pPr marL="1371600" indent="0" algn="ctr" defTabSz="914400" rtl="0" eaLnBrk="1" latinLnBrk="0" hangingPunct="1">
+              <a:lnSpc>
+                <a:spcPct val="90000"/>
+              </a:lnSpc>
+              <a:spcBef>
+                <a:spcPts val="800"/>
+              </a:spcBef>
+              <a:buSzPct val="80000"/>
+              <a:buFont typeface="Wingdings" panose="05000000000000000000" pitchFamily="2" charset="2"/>
+              <a:buNone/>
+              <a:defRPr sz="1600" kern="1200">
+                <a:solidFill>
+                  <a:schemeClr val="tx1"/>
+                </a:solidFill>
+                <a:latin typeface="+mn-lt"/>
+                <a:ea typeface="+mn-ea"/>
+                <a:cs typeface="+mn-cs"/>
+              </a:defRPr>
+            </a:lvl4pPr>
+            <a:lvl5pPr marL="1828800" indent="0" algn="ctr" defTabSz="914400" rtl="0" eaLnBrk="1" latinLnBrk="0" hangingPunct="1">
+              <a:lnSpc>
+                <a:spcPct val="90000"/>
+              </a:lnSpc>
+              <a:spcBef>
+                <a:spcPts val="800"/>
+              </a:spcBef>
+              <a:buSzPct val="80000"/>
+              <a:buFont typeface="Wingdings" panose="05000000000000000000" pitchFamily="2" charset="2"/>
+              <a:buNone/>
+              <a:defRPr sz="1600" kern="1200">
+                <a:solidFill>
+                  <a:schemeClr val="tx1"/>
+                </a:solidFill>
+                <a:latin typeface="+mn-lt"/>
+                <a:ea typeface="+mn-ea"/>
+                <a:cs typeface="+mn-cs"/>
+              </a:defRPr>
+            </a:lvl5pPr>
+            <a:lvl6pPr marL="2286000" indent="0" algn="ctr" defTabSz="914400" rtl="0" eaLnBrk="1" latinLnBrk="0" hangingPunct="1">
+              <a:lnSpc>
+                <a:spcPct val="90000"/>
+              </a:lnSpc>
+              <a:spcBef>
+                <a:spcPts val="800"/>
+              </a:spcBef>
+              <a:buSzPct val="80000"/>
+              <a:buFont typeface="Wingdings" panose="05000000000000000000" pitchFamily="2" charset="2"/>
+              <a:buNone/>
+              <a:defRPr sz="1600" kern="1200">
+                <a:solidFill>
+                  <a:schemeClr val="tx1"/>
+                </a:solidFill>
+                <a:latin typeface="+mn-lt"/>
+                <a:ea typeface="+mn-ea"/>
+                <a:cs typeface="+mn-cs"/>
+              </a:defRPr>
+            </a:lvl6pPr>
+            <a:lvl7pPr marL="2743200" indent="0" algn="ctr" defTabSz="914400" rtl="0" eaLnBrk="1" latinLnBrk="0" hangingPunct="1">
+              <a:lnSpc>
+                <a:spcPct val="90000"/>
+              </a:lnSpc>
+              <a:spcBef>
+                <a:spcPts val="800"/>
+              </a:spcBef>
+              <a:buSzPct val="80000"/>
+              <a:buFont typeface="Wingdings" panose="05000000000000000000" pitchFamily="2" charset="2"/>
+              <a:buNone/>
+              <a:defRPr sz="1600" kern="1200">
+                <a:solidFill>
+                  <a:schemeClr val="tx1"/>
+                </a:solidFill>
+                <a:latin typeface="+mn-lt"/>
+                <a:ea typeface="+mn-ea"/>
+                <a:cs typeface="+mn-cs"/>
+              </a:defRPr>
+            </a:lvl7pPr>
+            <a:lvl8pPr marL="3200400" indent="0" algn="ctr" defTabSz="914400" rtl="0" eaLnBrk="1" latinLnBrk="0" hangingPunct="1">
+              <a:lnSpc>
+                <a:spcPct val="90000"/>
+              </a:lnSpc>
+              <a:spcBef>
+                <a:spcPts val="800"/>
+              </a:spcBef>
+              <a:buSzPct val="80000"/>
+              <a:buFont typeface="Wingdings" panose="05000000000000000000" pitchFamily="2" charset="2"/>
+              <a:buNone/>
+              <a:defRPr sz="1600" kern="1200">
+                <a:solidFill>
+                  <a:schemeClr val="tx1"/>
+                </a:solidFill>
+                <a:latin typeface="+mn-lt"/>
+                <a:ea typeface="+mn-ea"/>
+                <a:cs typeface="+mn-cs"/>
+              </a:defRPr>
+            </a:lvl8pPr>
+            <a:lvl9pPr marL="3657600" indent="0" algn="ctr" defTabSz="914400" rtl="0" eaLnBrk="1" latinLnBrk="0" hangingPunct="1">
+              <a:lnSpc>
+                <a:spcPct val="90000"/>
+              </a:lnSpc>
+              <a:spcBef>
+                <a:spcPts val="800"/>
+              </a:spcBef>
+              <a:buSzPct val="80000"/>
+              <a:buFont typeface="Wingdings" panose="05000000000000000000" pitchFamily="2" charset="2"/>
+              <a:buNone/>
+              <a:defRPr sz="1600" kern="1200">
+                <a:solidFill>
+                  <a:schemeClr val="tx1"/>
+                </a:solidFill>
+                <a:latin typeface="+mn-lt"/>
+                <a:ea typeface="+mn-ea"/>
+                <a:cs typeface="+mn-cs"/>
+              </a:defRPr>
+            </a:lvl9pPr>
+          </a:lstStyle>
+          <a:p>
+            <a:pPr>
+              <a:lnSpc>
+                <a:spcPct val="120000"/>
+              </a:lnSpc>
+            </a:pPr>
+            <a:r>
+              <a:rPr lang="en-US" sz="1800" b="1" dirty="0">
+                <a:solidFill>
+                  <a:schemeClr val="accent2">
+                    <a:lumMod val="75000"/>
+                  </a:schemeClr>
+                </a:solidFill>
+                <a:hlinkClick r:id="rId5">
+                  <a:extLst>
+                    <a:ext uri="{A12FA001-AC4F-418D-AE19-62706E023703}">
+                      <ahyp:hlinkClr xmlns:ahyp="http://schemas.microsoft.com/office/drawing/2018/hyperlinkcolor" val="tx"/>
+                    </a:ext>
+                  </a:extLst>
+                </a:hlinkClick>
+              </a:rPr>
+              <a:t>https://github.com/yasenstar/python/tree/master/GUI_Python</a:t>
+            </a:r>
+            <a:endParaRPr lang="en-US" sz="1800" b="1" dirty="0">
+              <a:solidFill>
+                <a:schemeClr val="accent2">
+                  <a:lumMod val="75000"/>
+                </a:schemeClr>
+              </a:solidFill>
+            </a:endParaRPr>
+          </a:p>
+        </p:txBody>
+      </p:sp>
+      <p:pic>
+        <p:nvPicPr>
+          <p:cNvPr id="4" name="Picture 3">
+            <a:extLst>
+              <a:ext uri="{FF2B5EF4-FFF2-40B4-BE49-F238E27FC236}">
+                <a16:creationId xmlns:a16="http://schemas.microsoft.com/office/drawing/2014/main" id="{D0D3F459-3FCE-3C25-CBDA-EF7090AED6C5}"/>
+              </a:ext>
+            </a:extLst>
+          </p:cNvPr>
+          <p:cNvPicPr>
+            <a:picLocks noChangeAspect="1"/>
+          </p:cNvPicPr>
+          <p:nvPr/>
+        </p:nvPicPr>
+        <p:blipFill>
+          <a:blip r:embed="rId6"/>
+          <a:stretch>
+            <a:fillRect/>
+          </a:stretch>
+        </p:blipFill>
+        <p:spPr>
+          <a:xfrm>
+            <a:off x="7676094" y="2747345"/>
+            <a:ext cx="4081677" cy="2046754"/>
+          </a:xfrm>
+          <a:prstGeom prst="rect">
+            <a:avLst/>
+          </a:prstGeom>
+          <a:ln>
+            <a:noFill/>
+          </a:ln>
+          <a:effectLst>
+            <a:outerShdw blurRad="292100" dist="139700" dir="2700000" algn="tl" rotWithShape="0">
+              <a:srgbClr val="333333">
+                <a:alpha val="65000"/>
+              </a:srgbClr>
+            </a:outerShdw>
+          </a:effectLst>
+        </p:spPr>
+      </p:pic>
+      <p:sp>
+        <p:nvSpPr>
+          <p:cNvPr id="11" name="Content Placeholder 10">
+            <a:extLst>
+              <a:ext uri="{FF2B5EF4-FFF2-40B4-BE49-F238E27FC236}">
+                <a16:creationId xmlns:a16="http://schemas.microsoft.com/office/drawing/2014/main" id="{7C3450C3-30E6-D77B-39BD-B3E071FCC692}"/>
+              </a:ext>
+            </a:extLst>
+          </p:cNvPr>
+          <p:cNvSpPr>
+            <a:spLocks noGrp="1"/>
+          </p:cNvSpPr>
+          <p:nvPr>
+            <p:ph idx="1"/>
+          </p:nvPr>
+        </p:nvSpPr>
+        <p:spPr/>
+        <p:txBody>
+          <a:bodyPr/>
+          <a:lstStyle/>
+          <a:p>
+            <a:endParaRPr lang="en-US"/>
+          </a:p>
+        </p:txBody>
+      </p:sp>
+    </p:spTree>
+    <p:extLst>
+      <p:ext uri="{BB962C8B-B14F-4D97-AF65-F5344CB8AC3E}">
         <p14:creationId xmlns:p14="http://schemas.microsoft.com/office/powerpoint/2010/main" val="2057097921"/>
       </p:ext>
     </p:extLst>
@@ -6991,7 +7525,7 @@
 </p:sld>
 </file>
 
-<file path=ppt/slides/slide7.xml><?xml version="1.0" encoding="utf-8"?>
+<file path=ppt/slides/slide8.xml><?xml version="1.0" encoding="utf-8"?>
 <p:sld xmlns:a="http://schemas.openxmlformats.org/drawingml/2006/main" xmlns:r="http://schemas.openxmlformats.org/officeDocument/2006/relationships" xmlns:p="http://schemas.openxmlformats.org/presentationml/2006/main">
   <p:cSld>
     <p:spTree>

</xml_diff>

<commit_message>
add chapter08 part 3
</commit_message>
<xml_diff>
--- a/GUI_Python/Create_GUI_with_Python.pptx
+++ b/GUI_Python/Create_GUI_with_Python.pptx
@@ -5,10 +5,10 @@
     <p:sldMasterId id="2147483648" r:id="rId1"/>
   </p:sldMasterIdLst>
   <p:notesMasterIdLst>
-    <p:notesMasterId r:id="rId18"/>
+    <p:notesMasterId r:id="rId19"/>
   </p:notesMasterIdLst>
   <p:handoutMasterIdLst>
-    <p:handoutMasterId r:id="rId19"/>
+    <p:handoutMasterId r:id="rId20"/>
   </p:handoutMasterIdLst>
   <p:sldIdLst>
     <p:sldId id="256" r:id="rId2"/>
@@ -26,7 +26,8 @@
     <p:sldId id="269" r:id="rId14"/>
     <p:sldId id="270" r:id="rId15"/>
     <p:sldId id="271" r:id="rId16"/>
-    <p:sldId id="260" r:id="rId17"/>
+    <p:sldId id="272" r:id="rId17"/>
+    <p:sldId id="260" r:id="rId18"/>
   </p:sldIdLst>
   <p:sldSz cx="12192000" cy="6858000"/>
   <p:notesSz cx="6858000" cy="9144000"/>
@@ -794,7 +795,7 @@
           <a:p>
             <a:fld id="{935E2820-AFE1-45FA-949E-17BDB534E1DC}" type="slidenum">
               <a:rPr lang="en-US" smtClean="0"/>
-              <a:t>16</a:t>
+              <a:t>17</a:t>
             </a:fld>
             <a:endParaRPr lang="en-US"/>
           </a:p>
@@ -7106,7 +7107,7 @@
               <a:rPr lang="en-US" sz="4900" dirty="0">
                 <a:latin typeface="HarmonyOS Sans" panose="00000500000000000000" pitchFamily="2" charset="0"/>
               </a:rPr>
-              <a:t>014 Ch08 Flood It (add-on)</a:t>
+              <a:t>015 Ch08 Flood It (add-on)</a:t>
             </a:r>
             <a:endParaRPr lang="en-US" dirty="0">
               <a:latin typeface="HarmonyOS Sans" panose="00000500000000000000" pitchFamily="2" charset="0"/>
@@ -7563,6 +7564,505 @@
 </file>
 
 <file path=ppt/slides/slide16.xml><?xml version="1.0" encoding="utf-8"?>
+<p:sld xmlns:a="http://schemas.openxmlformats.org/drawingml/2006/main" xmlns:r="http://schemas.openxmlformats.org/officeDocument/2006/relationships" xmlns:p="http://schemas.openxmlformats.org/presentationml/2006/main">
+  <p:cSld>
+    <p:spTree>
+      <p:nvGrpSpPr>
+        <p:cNvPr id="1" name=""/>
+        <p:cNvGrpSpPr/>
+        <p:nvPr/>
+      </p:nvGrpSpPr>
+      <p:grpSpPr>
+        <a:xfrm>
+          <a:off x="0" y="0"/>
+          <a:ext cx="0" cy="0"/>
+          <a:chOff x="0" y="0"/>
+          <a:chExt cx="0" cy="0"/>
+        </a:xfrm>
+      </p:grpSpPr>
+      <p:sp>
+        <p:nvSpPr>
+          <p:cNvPr id="2" name="Title 1">
+            <a:extLst>
+              <a:ext uri="{FF2B5EF4-FFF2-40B4-BE49-F238E27FC236}">
+                <a16:creationId xmlns:a16="http://schemas.microsoft.com/office/drawing/2014/main" id="{60BDC9E0-4942-655E-4150-9691AA9C765B}"/>
+              </a:ext>
+            </a:extLst>
+          </p:cNvPr>
+          <p:cNvSpPr>
+            <a:spLocks noGrp="1"/>
+          </p:cNvSpPr>
+          <p:nvPr>
+            <p:ph type="title"/>
+          </p:nvPr>
+        </p:nvSpPr>
+        <p:spPr>
+          <a:xfrm>
+            <a:off x="2208213" y="304799"/>
+            <a:ext cx="9372600" cy="1649507"/>
+          </a:xfrm>
+        </p:spPr>
+        <p:txBody>
+          <a:bodyPr anchor="ctr">
+            <a:normAutofit/>
+          </a:bodyPr>
+          <a:lstStyle/>
+          <a:p>
+            <a:r>
+              <a:rPr lang="en-US" sz="4000" dirty="0">
+                <a:latin typeface="HarmonyOS Sans Black" panose="00000A00000000000000" pitchFamily="2" charset="0"/>
+              </a:rPr>
+              <a:t>Create GUI with Python</a:t>
+            </a:r>
+            <a:br>
+              <a:rPr lang="en-US" dirty="0">
+                <a:latin typeface="HarmonyOS Sans" panose="00000500000000000000" pitchFamily="2" charset="0"/>
+              </a:rPr>
+            </a:br>
+            <a:r>
+              <a:rPr lang="en-US" sz="4900" dirty="0">
+                <a:latin typeface="HarmonyOS Sans" panose="00000500000000000000" pitchFamily="2" charset="0"/>
+              </a:rPr>
+              <a:t>016 Ch09 Emoji Match</a:t>
+            </a:r>
+            <a:endParaRPr lang="en-US" dirty="0">
+              <a:latin typeface="HarmonyOS Sans" panose="00000500000000000000" pitchFamily="2" charset="0"/>
+            </a:endParaRPr>
+          </a:p>
+        </p:txBody>
+      </p:sp>
+      <p:pic>
+        <p:nvPicPr>
+          <p:cNvPr id="6" name="Picture 5">
+            <a:extLst>
+              <a:ext uri="{FF2B5EF4-FFF2-40B4-BE49-F238E27FC236}">
+                <a16:creationId xmlns:a16="http://schemas.microsoft.com/office/drawing/2014/main" id="{28525CF1-7DD8-7F22-12CB-14807078F0D7}"/>
+              </a:ext>
+            </a:extLst>
+          </p:cNvPr>
+          <p:cNvPicPr>
+            <a:picLocks noChangeAspect="1"/>
+          </p:cNvPicPr>
+          <p:nvPr/>
+        </p:nvPicPr>
+        <p:blipFill>
+          <a:blip r:embed="rId2"/>
+          <a:stretch>
+            <a:fillRect/>
+          </a:stretch>
+        </p:blipFill>
+        <p:spPr>
+          <a:xfrm>
+            <a:off x="119268" y="59634"/>
+            <a:ext cx="611187" cy="671551"/>
+          </a:xfrm>
+          <a:prstGeom prst="rect">
+            <a:avLst/>
+          </a:prstGeom>
+          <a:ln>
+            <a:noFill/>
+          </a:ln>
+          <a:effectLst>
+            <a:outerShdw blurRad="292100" dist="139700" dir="2700000" algn="tl" rotWithShape="0">
+              <a:srgbClr val="333333">
+                <a:alpha val="65000"/>
+              </a:srgbClr>
+            </a:outerShdw>
+          </a:effectLst>
+        </p:spPr>
+      </p:pic>
+      <p:pic>
+        <p:nvPicPr>
+          <p:cNvPr id="7" name="Picture 6">
+            <a:extLst>
+              <a:ext uri="{FF2B5EF4-FFF2-40B4-BE49-F238E27FC236}">
+                <a16:creationId xmlns:a16="http://schemas.microsoft.com/office/drawing/2014/main" id="{ACE06191-4455-E539-6992-17D338C10648}"/>
+              </a:ext>
+            </a:extLst>
+          </p:cNvPr>
+          <p:cNvPicPr>
+            <a:picLocks noChangeAspect="1"/>
+          </p:cNvPicPr>
+          <p:nvPr/>
+        </p:nvPicPr>
+        <p:blipFill>
+          <a:blip r:embed="rId3"/>
+          <a:stretch>
+            <a:fillRect/>
+          </a:stretch>
+        </p:blipFill>
+        <p:spPr>
+          <a:xfrm>
+            <a:off x="0" y="6471564"/>
+            <a:ext cx="1855694" cy="386435"/>
+          </a:xfrm>
+          <a:prstGeom prst="rect">
+            <a:avLst/>
+          </a:prstGeom>
+          <a:ln>
+            <a:noFill/>
+          </a:ln>
+          <a:effectLst>
+            <a:outerShdw blurRad="292100" dist="139700" dir="2700000" algn="tl" rotWithShape="0">
+              <a:srgbClr val="333333">
+                <a:alpha val="65000"/>
+              </a:srgbClr>
+            </a:outerShdw>
+          </a:effectLst>
+        </p:spPr>
+      </p:pic>
+      <p:pic>
+        <p:nvPicPr>
+          <p:cNvPr id="8" name="Picture 7">
+            <a:extLst>
+              <a:ext uri="{FF2B5EF4-FFF2-40B4-BE49-F238E27FC236}">
+                <a16:creationId xmlns:a16="http://schemas.microsoft.com/office/drawing/2014/main" id="{E815D6CC-086C-CEEA-B605-CC7A17A0C652}"/>
+              </a:ext>
+            </a:extLst>
+          </p:cNvPr>
+          <p:cNvPicPr>
+            <a:picLocks noChangeAspect="1"/>
+          </p:cNvPicPr>
+          <p:nvPr/>
+        </p:nvPicPr>
+        <p:blipFill>
+          <a:blip r:embed="rId4"/>
+          <a:stretch>
+            <a:fillRect/>
+          </a:stretch>
+        </p:blipFill>
+        <p:spPr>
+          <a:xfrm>
+            <a:off x="119268" y="863897"/>
+            <a:ext cx="1374374" cy="2071274"/>
+          </a:xfrm>
+          <a:prstGeom prst="rect">
+            <a:avLst/>
+          </a:prstGeom>
+          <a:ln>
+            <a:noFill/>
+          </a:ln>
+          <a:effectLst>
+            <a:outerShdw blurRad="292100" dist="139700" dir="2700000" algn="tl" rotWithShape="0">
+              <a:srgbClr val="333333">
+                <a:alpha val="65000"/>
+              </a:srgbClr>
+            </a:outerShdw>
+          </a:effectLst>
+        </p:spPr>
+      </p:pic>
+      <p:sp>
+        <p:nvSpPr>
+          <p:cNvPr id="9" name="Subtitle 5">
+            <a:extLst>
+              <a:ext uri="{FF2B5EF4-FFF2-40B4-BE49-F238E27FC236}">
+                <a16:creationId xmlns:a16="http://schemas.microsoft.com/office/drawing/2014/main" id="{B98C3EDB-7ABC-5858-0198-A6F89107DC04}"/>
+              </a:ext>
+            </a:extLst>
+          </p:cNvPr>
+          <p:cNvSpPr txBox="1">
+            <a:spLocks/>
+          </p:cNvSpPr>
+          <p:nvPr/>
+        </p:nvSpPr>
+        <p:spPr>
+          <a:xfrm>
+            <a:off x="2747347" y="6471564"/>
+            <a:ext cx="7704856" cy="367591"/>
+          </a:xfrm>
+          <a:prstGeom prst="rect">
+            <a:avLst/>
+          </a:prstGeom>
+        </p:spPr>
+        <p:txBody>
+          <a:bodyPr vert="horz" lIns="91440" tIns="45720" rIns="91440" bIns="45720" rtlCol="0">
+            <a:normAutofit lnSpcReduction="10000"/>
+          </a:bodyPr>
+          <a:lstStyle>
+            <a:lvl1pPr marL="0" indent="0" algn="l" defTabSz="914400" rtl="0" eaLnBrk="1" latinLnBrk="0" hangingPunct="1">
+              <a:lnSpc>
+                <a:spcPct val="90000"/>
+              </a:lnSpc>
+              <a:spcBef>
+                <a:spcPts val="0"/>
+              </a:spcBef>
+              <a:buSzPct val="80000"/>
+              <a:buFont typeface="Wingdings" panose="05000000000000000000" pitchFamily="2" charset="2"/>
+              <a:buNone/>
+              <a:defRPr sz="2400" kern="1200">
+                <a:solidFill>
+                  <a:schemeClr val="accent2"/>
+                </a:solidFill>
+                <a:latin typeface="+mn-lt"/>
+                <a:ea typeface="+mn-ea"/>
+                <a:cs typeface="+mn-cs"/>
+              </a:defRPr>
+            </a:lvl1pPr>
+            <a:lvl2pPr marL="457200" indent="0" algn="ctr" defTabSz="914400" rtl="0" eaLnBrk="1" latinLnBrk="0" hangingPunct="1">
+              <a:lnSpc>
+                <a:spcPct val="90000"/>
+              </a:lnSpc>
+              <a:spcBef>
+                <a:spcPts val="1000"/>
+              </a:spcBef>
+              <a:buSzPct val="80000"/>
+              <a:buFont typeface="Wingdings" panose="05000000000000000000" pitchFamily="2" charset="2"/>
+              <a:buNone/>
+              <a:defRPr sz="2000" kern="1200">
+                <a:solidFill>
+                  <a:schemeClr val="tx1"/>
+                </a:solidFill>
+                <a:latin typeface="+mn-lt"/>
+                <a:ea typeface="+mn-ea"/>
+                <a:cs typeface="+mn-cs"/>
+              </a:defRPr>
+            </a:lvl2pPr>
+            <a:lvl3pPr marL="914400" indent="0" algn="ctr" defTabSz="914400" rtl="0" eaLnBrk="1" latinLnBrk="0" hangingPunct="1">
+              <a:lnSpc>
+                <a:spcPct val="90000"/>
+              </a:lnSpc>
+              <a:spcBef>
+                <a:spcPts val="800"/>
+              </a:spcBef>
+              <a:buSzPct val="80000"/>
+              <a:buFont typeface="Wingdings" panose="05000000000000000000" pitchFamily="2" charset="2"/>
+              <a:buNone/>
+              <a:defRPr sz="1800" kern="1200">
+                <a:solidFill>
+                  <a:schemeClr val="tx1"/>
+                </a:solidFill>
+                <a:latin typeface="+mn-lt"/>
+                <a:ea typeface="+mn-ea"/>
+                <a:cs typeface="+mn-cs"/>
+              </a:defRPr>
+            </a:lvl3pPr>
+            <a:lvl4pPr marL="1371600" indent="0" algn="ctr" defTabSz="914400" rtl="0" eaLnBrk="1" latinLnBrk="0" hangingPunct="1">
+              <a:lnSpc>
+                <a:spcPct val="90000"/>
+              </a:lnSpc>
+              <a:spcBef>
+                <a:spcPts val="800"/>
+              </a:spcBef>
+              <a:buSzPct val="80000"/>
+              <a:buFont typeface="Wingdings" panose="05000000000000000000" pitchFamily="2" charset="2"/>
+              <a:buNone/>
+              <a:defRPr sz="1600" kern="1200">
+                <a:solidFill>
+                  <a:schemeClr val="tx1"/>
+                </a:solidFill>
+                <a:latin typeface="+mn-lt"/>
+                <a:ea typeface="+mn-ea"/>
+                <a:cs typeface="+mn-cs"/>
+              </a:defRPr>
+            </a:lvl4pPr>
+            <a:lvl5pPr marL="1828800" indent="0" algn="ctr" defTabSz="914400" rtl="0" eaLnBrk="1" latinLnBrk="0" hangingPunct="1">
+              <a:lnSpc>
+                <a:spcPct val="90000"/>
+              </a:lnSpc>
+              <a:spcBef>
+                <a:spcPts val="800"/>
+              </a:spcBef>
+              <a:buSzPct val="80000"/>
+              <a:buFont typeface="Wingdings" panose="05000000000000000000" pitchFamily="2" charset="2"/>
+              <a:buNone/>
+              <a:defRPr sz="1600" kern="1200">
+                <a:solidFill>
+                  <a:schemeClr val="tx1"/>
+                </a:solidFill>
+                <a:latin typeface="+mn-lt"/>
+                <a:ea typeface="+mn-ea"/>
+                <a:cs typeface="+mn-cs"/>
+              </a:defRPr>
+            </a:lvl5pPr>
+            <a:lvl6pPr marL="2286000" indent="0" algn="ctr" defTabSz="914400" rtl="0" eaLnBrk="1" latinLnBrk="0" hangingPunct="1">
+              <a:lnSpc>
+                <a:spcPct val="90000"/>
+              </a:lnSpc>
+              <a:spcBef>
+                <a:spcPts val="800"/>
+              </a:spcBef>
+              <a:buSzPct val="80000"/>
+              <a:buFont typeface="Wingdings" panose="05000000000000000000" pitchFamily="2" charset="2"/>
+              <a:buNone/>
+              <a:defRPr sz="1600" kern="1200">
+                <a:solidFill>
+                  <a:schemeClr val="tx1"/>
+                </a:solidFill>
+                <a:latin typeface="+mn-lt"/>
+                <a:ea typeface="+mn-ea"/>
+                <a:cs typeface="+mn-cs"/>
+              </a:defRPr>
+            </a:lvl6pPr>
+            <a:lvl7pPr marL="2743200" indent="0" algn="ctr" defTabSz="914400" rtl="0" eaLnBrk="1" latinLnBrk="0" hangingPunct="1">
+              <a:lnSpc>
+                <a:spcPct val="90000"/>
+              </a:lnSpc>
+              <a:spcBef>
+                <a:spcPts val="800"/>
+              </a:spcBef>
+              <a:buSzPct val="80000"/>
+              <a:buFont typeface="Wingdings" panose="05000000000000000000" pitchFamily="2" charset="2"/>
+              <a:buNone/>
+              <a:defRPr sz="1600" kern="1200">
+                <a:solidFill>
+                  <a:schemeClr val="tx1"/>
+                </a:solidFill>
+                <a:latin typeface="+mn-lt"/>
+                <a:ea typeface="+mn-ea"/>
+                <a:cs typeface="+mn-cs"/>
+              </a:defRPr>
+            </a:lvl7pPr>
+            <a:lvl8pPr marL="3200400" indent="0" algn="ctr" defTabSz="914400" rtl="0" eaLnBrk="1" latinLnBrk="0" hangingPunct="1">
+              <a:lnSpc>
+                <a:spcPct val="90000"/>
+              </a:lnSpc>
+              <a:spcBef>
+                <a:spcPts val="800"/>
+              </a:spcBef>
+              <a:buSzPct val="80000"/>
+              <a:buFont typeface="Wingdings" panose="05000000000000000000" pitchFamily="2" charset="2"/>
+              <a:buNone/>
+              <a:defRPr sz="1600" kern="1200">
+                <a:solidFill>
+                  <a:schemeClr val="tx1"/>
+                </a:solidFill>
+                <a:latin typeface="+mn-lt"/>
+                <a:ea typeface="+mn-ea"/>
+                <a:cs typeface="+mn-cs"/>
+              </a:defRPr>
+            </a:lvl8pPr>
+            <a:lvl9pPr marL="3657600" indent="0" algn="ctr" defTabSz="914400" rtl="0" eaLnBrk="1" latinLnBrk="0" hangingPunct="1">
+              <a:lnSpc>
+                <a:spcPct val="90000"/>
+              </a:lnSpc>
+              <a:spcBef>
+                <a:spcPts val="800"/>
+              </a:spcBef>
+              <a:buSzPct val="80000"/>
+              <a:buFont typeface="Wingdings" panose="05000000000000000000" pitchFamily="2" charset="2"/>
+              <a:buNone/>
+              <a:defRPr sz="1600" kern="1200">
+                <a:solidFill>
+                  <a:schemeClr val="tx1"/>
+                </a:solidFill>
+                <a:latin typeface="+mn-lt"/>
+                <a:ea typeface="+mn-ea"/>
+                <a:cs typeface="+mn-cs"/>
+              </a:defRPr>
+            </a:lvl9pPr>
+          </a:lstStyle>
+          <a:p>
+            <a:pPr>
+              <a:lnSpc>
+                <a:spcPct val="120000"/>
+              </a:lnSpc>
+            </a:pPr>
+            <a:r>
+              <a:rPr lang="en-US" sz="1800" b="1" dirty="0">
+                <a:solidFill>
+                  <a:schemeClr val="accent2">
+                    <a:lumMod val="75000"/>
+                  </a:schemeClr>
+                </a:solidFill>
+                <a:hlinkClick r:id="rId5">
+                  <a:extLst>
+                    <a:ext uri="{A12FA001-AC4F-418D-AE19-62706E023703}">
+                      <ahyp:hlinkClr xmlns:ahyp="http://schemas.microsoft.com/office/drawing/2018/hyperlinkcolor" val="tx"/>
+                    </a:ext>
+                  </a:extLst>
+                </a:hlinkClick>
+              </a:rPr>
+              <a:t>https://github.com/yasenstar/python/tree/master/GUI_Python</a:t>
+            </a:r>
+            <a:endParaRPr lang="en-US" sz="1800" b="1" dirty="0">
+              <a:solidFill>
+                <a:schemeClr val="accent2">
+                  <a:lumMod val="75000"/>
+                </a:schemeClr>
+              </a:solidFill>
+            </a:endParaRPr>
+          </a:p>
+        </p:txBody>
+      </p:sp>
+      <p:pic>
+        <p:nvPicPr>
+          <p:cNvPr id="4" name="Picture 3">
+            <a:extLst>
+              <a:ext uri="{FF2B5EF4-FFF2-40B4-BE49-F238E27FC236}">
+                <a16:creationId xmlns:a16="http://schemas.microsoft.com/office/drawing/2014/main" id="{92C42876-5D84-9444-1AA9-7956CC90F1E8}"/>
+              </a:ext>
+            </a:extLst>
+          </p:cNvPr>
+          <p:cNvPicPr>
+            <a:picLocks noChangeAspect="1"/>
+          </p:cNvPicPr>
+          <p:nvPr/>
+        </p:nvPicPr>
+        <p:blipFill>
+          <a:blip r:embed="rId6"/>
+          <a:stretch>
+            <a:fillRect/>
+          </a:stretch>
+        </p:blipFill>
+        <p:spPr>
+          <a:xfrm>
+            <a:off x="7801373" y="2635624"/>
+            <a:ext cx="3989456" cy="2024062"/>
+          </a:xfrm>
+          <a:prstGeom prst="rect">
+            <a:avLst/>
+          </a:prstGeom>
+          <a:ln>
+            <a:noFill/>
+          </a:ln>
+          <a:effectLst>
+            <a:outerShdw blurRad="292100" dist="139700" dir="2700000" algn="tl" rotWithShape="0">
+              <a:srgbClr val="333333">
+                <a:alpha val="65000"/>
+              </a:srgbClr>
+            </a:outerShdw>
+          </a:effectLst>
+        </p:spPr>
+      </p:pic>
+      <p:sp>
+        <p:nvSpPr>
+          <p:cNvPr id="12" name="Content Placeholder 11">
+            <a:extLst>
+              <a:ext uri="{FF2B5EF4-FFF2-40B4-BE49-F238E27FC236}">
+                <a16:creationId xmlns:a16="http://schemas.microsoft.com/office/drawing/2014/main" id="{EFD81142-B13F-8A55-9C50-53DBB587017B}"/>
+              </a:ext>
+            </a:extLst>
+          </p:cNvPr>
+          <p:cNvSpPr>
+            <a:spLocks noGrp="1"/>
+          </p:cNvSpPr>
+          <p:nvPr>
+            <p:ph idx="1"/>
+          </p:nvPr>
+        </p:nvSpPr>
+        <p:spPr/>
+        <p:txBody>
+          <a:bodyPr/>
+          <a:lstStyle/>
+          <a:p>
+            <a:endParaRPr lang="en-US"/>
+          </a:p>
+        </p:txBody>
+      </p:sp>
+    </p:spTree>
+    <p:extLst>
+      <p:ext uri="{BB962C8B-B14F-4D97-AF65-F5344CB8AC3E}">
+        <p14:creationId xmlns:p14="http://schemas.microsoft.com/office/powerpoint/2010/main" val="2157623215"/>
+      </p:ext>
+    </p:extLst>
+  </p:cSld>
+  <p:clrMapOvr>
+    <a:masterClrMapping/>
+  </p:clrMapOvr>
+</p:sld>
+</file>
+
+<file path=ppt/slides/slide17.xml><?xml version="1.0" encoding="utf-8"?>
 <p:sld xmlns:a="http://schemas.openxmlformats.org/drawingml/2006/main" xmlns:r="http://schemas.openxmlformats.org/officeDocument/2006/relationships" xmlns:p="http://schemas.openxmlformats.org/presentationml/2006/main">
   <p:cSld>
     <p:spTree>

</xml_diff>